<commit_message>
Make the notaion consistent with method section
</commit_message>
<xml_diff>
--- a/figures/pptx files/fig_DL_Pipeline.pptx
+++ b/figures/pptx files/fig_DL_Pipeline.pptx
@@ -274,7 +274,7 @@
           <a:p>
             <a:fld id="{3B276FCD-F082-45A6-8C97-26B866899B8F}" type="datetimeFigureOut">
               <a:rPr lang="en-US" smtClean="0"/>
-              <a:t>9/13/2019</a:t>
+              <a:t>9/15/2019</a:t>
             </a:fld>
             <a:endParaRPr lang="en-US"/>
           </a:p>
@@ -472,7 +472,7 @@
           <a:p>
             <a:fld id="{3B276FCD-F082-45A6-8C97-26B866899B8F}" type="datetimeFigureOut">
               <a:rPr lang="en-US" smtClean="0"/>
-              <a:t>9/13/2019</a:t>
+              <a:t>9/15/2019</a:t>
             </a:fld>
             <a:endParaRPr lang="en-US"/>
           </a:p>
@@ -680,7 +680,7 @@
           <a:p>
             <a:fld id="{3B276FCD-F082-45A6-8C97-26B866899B8F}" type="datetimeFigureOut">
               <a:rPr lang="en-US" smtClean="0"/>
-              <a:t>9/13/2019</a:t>
+              <a:t>9/15/2019</a:t>
             </a:fld>
             <a:endParaRPr lang="en-US"/>
           </a:p>
@@ -878,7 +878,7 @@
           <a:p>
             <a:fld id="{3B276FCD-F082-45A6-8C97-26B866899B8F}" type="datetimeFigureOut">
               <a:rPr lang="en-US" smtClean="0"/>
-              <a:t>9/13/2019</a:t>
+              <a:t>9/15/2019</a:t>
             </a:fld>
             <a:endParaRPr lang="en-US"/>
           </a:p>
@@ -1153,7 +1153,7 @@
           <a:p>
             <a:fld id="{3B276FCD-F082-45A6-8C97-26B866899B8F}" type="datetimeFigureOut">
               <a:rPr lang="en-US" smtClean="0"/>
-              <a:t>9/13/2019</a:t>
+              <a:t>9/15/2019</a:t>
             </a:fld>
             <a:endParaRPr lang="en-US"/>
           </a:p>
@@ -1418,7 +1418,7 @@
           <a:p>
             <a:fld id="{3B276FCD-F082-45A6-8C97-26B866899B8F}" type="datetimeFigureOut">
               <a:rPr lang="en-US" smtClean="0"/>
-              <a:t>9/13/2019</a:t>
+              <a:t>9/15/2019</a:t>
             </a:fld>
             <a:endParaRPr lang="en-US"/>
           </a:p>
@@ -1830,7 +1830,7 @@
           <a:p>
             <a:fld id="{3B276FCD-F082-45A6-8C97-26B866899B8F}" type="datetimeFigureOut">
               <a:rPr lang="en-US" smtClean="0"/>
-              <a:t>9/13/2019</a:t>
+              <a:t>9/15/2019</a:t>
             </a:fld>
             <a:endParaRPr lang="en-US"/>
           </a:p>
@@ -1971,7 +1971,7 @@
           <a:p>
             <a:fld id="{3B276FCD-F082-45A6-8C97-26B866899B8F}" type="datetimeFigureOut">
               <a:rPr lang="en-US" smtClean="0"/>
-              <a:t>9/13/2019</a:t>
+              <a:t>9/15/2019</a:t>
             </a:fld>
             <a:endParaRPr lang="en-US"/>
           </a:p>
@@ -2084,7 +2084,7 @@
           <a:p>
             <a:fld id="{3B276FCD-F082-45A6-8C97-26B866899B8F}" type="datetimeFigureOut">
               <a:rPr lang="en-US" smtClean="0"/>
-              <a:t>9/13/2019</a:t>
+              <a:t>9/15/2019</a:t>
             </a:fld>
             <a:endParaRPr lang="en-US"/>
           </a:p>
@@ -2395,7 +2395,7 @@
           <a:p>
             <a:fld id="{3B276FCD-F082-45A6-8C97-26B866899B8F}" type="datetimeFigureOut">
               <a:rPr lang="en-US" smtClean="0"/>
-              <a:t>9/13/2019</a:t>
+              <a:t>9/15/2019</a:t>
             </a:fld>
             <a:endParaRPr lang="en-US"/>
           </a:p>
@@ -2683,7 +2683,7 @@
           <a:p>
             <a:fld id="{3B276FCD-F082-45A6-8C97-26B866899B8F}" type="datetimeFigureOut">
               <a:rPr lang="en-US" smtClean="0"/>
-              <a:t>9/13/2019</a:t>
+              <a:t>9/15/2019</a:t>
             </a:fld>
             <a:endParaRPr lang="en-US"/>
           </a:p>
@@ -2924,7 +2924,7 @@
           <a:p>
             <a:fld id="{3B276FCD-F082-45A6-8C97-26B866899B8F}" type="datetimeFigureOut">
               <a:rPr lang="en-US" smtClean="0"/>
-              <a:t>9/13/2019</a:t>
+              <a:t>9/15/2019</a:t>
             </a:fld>
             <a:endParaRPr lang="en-US"/>
           </a:p>
@@ -26119,7 +26119,7 @@
             <p:spPr>
               <a:xfrm>
                 <a:off x="7815717" y="1787581"/>
-                <a:ext cx="862416" cy="261610"/>
+                <a:ext cx="829651" cy="253916"/>
               </a:xfrm>
               <a:prstGeom prst="rect">
                 <a:avLst/>
@@ -26161,18 +26161,6 @@
                         <a:rPr lang="en-US" sz="1050" b="1" i="1" smtClean="0">
                           <a:latin typeface="Cambria Math" panose="02040503050406030204" pitchFamily="18" charset="0"/>
                         </a:rPr>
-                        <m:t>−</m:t>
-                      </m:r>
-                      <m:r>
-                        <a:rPr lang="en-US" sz="1050" b="1" i="1" smtClean="0">
-                          <a:latin typeface="Cambria Math" panose="02040503050406030204" pitchFamily="18" charset="0"/>
-                        </a:rPr>
-                        <m:t>𝟏</m:t>
-                      </m:r>
-                      <m:r>
-                        <a:rPr lang="en-US" sz="1050" b="1" i="1" smtClean="0">
-                          <a:latin typeface="Cambria Math" panose="02040503050406030204" pitchFamily="18" charset="0"/>
-                        </a:rPr>
                         <m:t>, </m:t>
                       </m:r>
                       <m:r>
@@ -26180,6 +26168,18 @@
                           <a:latin typeface="Cambria Math" panose="02040503050406030204" pitchFamily="18" charset="0"/>
                         </a:rPr>
                         <m:t>𝒕</m:t>
+                      </m:r>
+                      <m:r>
+                        <a:rPr lang="en-US" sz="1050" b="1" i="1" smtClean="0">
+                          <a:latin typeface="Cambria Math" panose="02040503050406030204" pitchFamily="18" charset="0"/>
+                        </a:rPr>
+                        <m:t>+</m:t>
+                      </m:r>
+                      <m:r>
+                        <a:rPr lang="en-US" sz="1050" b="1" i="1" smtClean="0">
+                          <a:latin typeface="Cambria Math" panose="02040503050406030204" pitchFamily="18" charset="0"/>
+                        </a:rPr>
+                        <m:t>𝟏</m:t>
                       </m:r>
                       <m:r>
                         <a:rPr lang="en-US" sz="1050" b="1" i="0" smtClean="0">
@@ -26213,7 +26213,7 @@
             <p:spPr>
               <a:xfrm>
                 <a:off x="7815717" y="1787581"/>
-                <a:ext cx="862416" cy="261610"/>
+                <a:ext cx="829651" cy="253916"/>
               </a:xfrm>
               <a:prstGeom prst="rect">
                 <a:avLst/>
@@ -26221,7 +26221,7 @@
               <a:blipFill>
                 <a:blip r:embed="rId2"/>
                 <a:stretch>
-                  <a:fillRect b="-4651"/>
+                  <a:fillRect b="-7143"/>
                 </a:stretch>
               </a:blipFill>
             </p:spPr>
@@ -26305,7 +26305,7 @@
                         <a:rPr lang="en-US" sz="1050" b="1" i="1" smtClean="0">
                           <a:latin typeface="Cambria Math" panose="02040503050406030204" pitchFamily="18" charset="0"/>
                         </a:rPr>
-                        <m:t>𝟐</m:t>
+                        <m:t>𝟏</m:t>
                       </m:r>
                       <m:r>
                         <a:rPr lang="en-US" sz="1050" b="1" i="1" smtClean="0">
@@ -26383,7 +26383,7 @@
             <p:spPr>
               <a:xfrm>
                 <a:off x="3225040" y="1837959"/>
-                <a:ext cx="725070" cy="261610"/>
+                <a:ext cx="699807" cy="253916"/>
               </a:xfrm>
               <a:prstGeom prst="rect">
                 <a:avLst/>
@@ -26425,19 +26425,7 @@
                         <a:rPr lang="en-US" sz="1050" b="1" i="1" smtClean="0">
                           <a:latin typeface="Cambria Math" panose="02040503050406030204" pitchFamily="18" charset="0"/>
                         </a:rPr>
-                        <m:t>−</m:t>
-                      </m:r>
-                      <m:r>
-                        <a:rPr lang="en-US" sz="1050" b="1" i="1" smtClean="0">
-                          <a:latin typeface="Cambria Math" panose="02040503050406030204" pitchFamily="18" charset="0"/>
-                        </a:rPr>
-                        <m:t>𝝉</m:t>
-                      </m:r>
-                      <m:r>
-                        <a:rPr lang="en-US" sz="1050" b="1" i="1" smtClean="0">
-                          <a:latin typeface="Cambria Math" panose="02040503050406030204" pitchFamily="18" charset="0"/>
-                        </a:rPr>
-                        <m:t>)</m:t>
+                        <m:t>−ℓ)</m:t>
                       </m:r>
                     </m:oMath>
                   </m:oMathPara>
@@ -26465,7 +26453,7 @@
             <p:spPr>
               <a:xfrm>
                 <a:off x="3225040" y="1837959"/>
-                <a:ext cx="725070" cy="261610"/>
+                <a:ext cx="699807" cy="253916"/>
               </a:xfrm>
               <a:prstGeom prst="rect">
                 <a:avLst/>
@@ -26473,7 +26461,7 @@
               <a:blipFill>
                 <a:blip r:embed="rId4"/>
                 <a:stretch>
-                  <a:fillRect b="-4762"/>
+                  <a:fillRect b="-7317"/>
                 </a:stretch>
               </a:blipFill>
             </p:spPr>
@@ -26624,7 +26612,7 @@
             <p:spPr>
               <a:xfrm>
                 <a:off x="7784256" y="3138049"/>
-                <a:ext cx="790345" cy="597279"/>
+                <a:ext cx="775918" cy="597279"/>
               </a:xfrm>
               <a:prstGeom prst="rect">
                 <a:avLst/>
@@ -26694,99 +26682,7 @@
                         <m:t>𝒕</m:t>
                       </m:r>
                       <m:r>
-                        <a:rPr lang="en-US" sz="1050" b="1" i="1" smtClean="0">
-                          <a:latin typeface="Cambria Math" panose="02040503050406030204" pitchFamily="18" charset="0"/>
-                        </a:rPr>
-                        <m:t>−</m:t>
-                      </m:r>
-                      <m:r>
-                        <a:rPr lang="en-US" sz="1050" b="1" i="1" smtClean="0">
-                          <a:latin typeface="Cambria Math" panose="02040503050406030204" pitchFamily="18" charset="0"/>
-                        </a:rPr>
-                        <m:t>𝟏</m:t>
-                      </m:r>
-                      <m:r>
                         <a:rPr lang="en-US" sz="1050" b="1" i="0" smtClean="0">
-                          <a:latin typeface="Cambria Math" panose="02040503050406030204" pitchFamily="18" charset="0"/>
-                        </a:rPr>
-                        <m:t>)</m:t>
-                      </m:r>
-                    </m:oMath>
-                  </m:oMathPara>
-                </a14:m>
-                <a:endParaRPr lang="en-US" sz="1050" b="1" dirty="0"/>
-              </a:p>
-              <a:p>
-                <a:pPr/>
-                <a14:m>
-                  <m:oMathPara xmlns:m="http://schemas.openxmlformats.org/officeDocument/2006/math">
-                    <m:oMathParaPr>
-                      <m:jc m:val="centerGroup"/>
-                    </m:oMathParaPr>
-                    <m:oMath xmlns:m="http://schemas.openxmlformats.org/officeDocument/2006/math">
-                      <m:acc>
-                        <m:accPr>
-                          <m:chr m:val="̂"/>
-                          <m:ctrlPr>
-                            <a:rPr lang="en-US" sz="1050" b="1" i="1" smtClean="0">
-                              <a:latin typeface="Cambria Math" panose="02040503050406030204" pitchFamily="18" charset="0"/>
-                            </a:rPr>
-                          </m:ctrlPr>
-                        </m:accPr>
-                        <m:e>
-                          <m:sSub>
-                            <m:sSubPr>
-                              <m:ctrlPr>
-                                <a:rPr lang="en-US" sz="1050" b="1" i="1" smtClean="0">
-                                  <a:latin typeface="Cambria Math" panose="02040503050406030204" pitchFamily="18" charset="0"/>
-                                </a:rPr>
-                              </m:ctrlPr>
-                            </m:sSubPr>
-                            <m:e>
-                              <m:r>
-                                <a:rPr lang="en-US" sz="1050" b="1" i="1" smtClean="0">
-                                  <a:latin typeface="Cambria Math" panose="02040503050406030204" pitchFamily="18" charset="0"/>
-                                </a:rPr>
-                                <m:t>𝜽</m:t>
-                              </m:r>
-                            </m:e>
-                            <m:sub>
-                              <m:r>
-                                <a:rPr lang="en-US" sz="1050" b="1" i="1" smtClean="0">
-                                  <a:latin typeface="Cambria Math" panose="02040503050406030204" pitchFamily="18" charset="0"/>
-                                </a:rPr>
-                                <m:t>𝑭</m:t>
-                              </m:r>
-                            </m:sub>
-                          </m:sSub>
-                        </m:e>
-                      </m:acc>
-                      <m:r>
-                        <a:rPr lang="en-US" sz="1050" b="1" i="1">
-                          <a:latin typeface="Cambria Math" panose="02040503050406030204" pitchFamily="18" charset="0"/>
-                        </a:rPr>
-                        <m:t>(</m:t>
-                      </m:r>
-                      <m:r>
-                        <a:rPr lang="en-US" sz="1050" b="1" i="1">
-                          <a:latin typeface="Cambria Math" panose="02040503050406030204" pitchFamily="18" charset="0"/>
-                        </a:rPr>
-                        <m:t>𝒕</m:t>
-                      </m:r>
-                      <m:r>
-                        <a:rPr lang="en-US" sz="1050" b="1" i="1">
-                          <a:latin typeface="Cambria Math" panose="02040503050406030204" pitchFamily="18" charset="0"/>
-                        </a:rPr>
-                        <m:t>−</m:t>
-                      </m:r>
-                      <m:r>
-                        <a:rPr lang="en-US" sz="1050" b="1" i="1">
-                          <a:latin typeface="Cambria Math" panose="02040503050406030204" pitchFamily="18" charset="0"/>
-                        </a:rPr>
-                        <m:t>𝟏</m:t>
-                      </m:r>
-                      <m:r>
-                        <a:rPr lang="en-US" sz="1050" b="1">
                           <a:latin typeface="Cambria Math" panose="02040503050406030204" pitchFamily="18" charset="0"/>
                         </a:rPr>
                         <m:t>)</m:t>
@@ -26864,6 +26760,86 @@
                 </a14:m>
                 <a:endParaRPr lang="en-US" sz="1050" b="1" dirty="0"/>
               </a:p>
+              <a:p>
+                <a:pPr/>
+                <a14:m>
+                  <m:oMathPara xmlns:m="http://schemas.openxmlformats.org/officeDocument/2006/math">
+                    <m:oMathParaPr>
+                      <m:jc m:val="centerGroup"/>
+                    </m:oMathParaPr>
+                    <m:oMath xmlns:m="http://schemas.openxmlformats.org/officeDocument/2006/math">
+                      <m:acc>
+                        <m:accPr>
+                          <m:chr m:val="̂"/>
+                          <m:ctrlPr>
+                            <a:rPr lang="en-US" sz="1050" b="1" i="1" smtClean="0">
+                              <a:latin typeface="Cambria Math" panose="02040503050406030204" pitchFamily="18" charset="0"/>
+                            </a:rPr>
+                          </m:ctrlPr>
+                        </m:accPr>
+                        <m:e>
+                          <m:sSub>
+                            <m:sSubPr>
+                              <m:ctrlPr>
+                                <a:rPr lang="en-US" sz="1050" b="1" i="1" smtClean="0">
+                                  <a:latin typeface="Cambria Math" panose="02040503050406030204" pitchFamily="18" charset="0"/>
+                                </a:rPr>
+                              </m:ctrlPr>
+                            </m:sSubPr>
+                            <m:e>
+                              <m:r>
+                                <a:rPr lang="en-US" sz="1050" b="1" i="1" smtClean="0">
+                                  <a:latin typeface="Cambria Math" panose="02040503050406030204" pitchFamily="18" charset="0"/>
+                                </a:rPr>
+                                <m:t>𝜽</m:t>
+                              </m:r>
+                            </m:e>
+                            <m:sub>
+                              <m:r>
+                                <a:rPr lang="en-US" sz="1050" b="1" i="1" smtClean="0">
+                                  <a:latin typeface="Cambria Math" panose="02040503050406030204" pitchFamily="18" charset="0"/>
+                                </a:rPr>
+                                <m:t>𝑭</m:t>
+                              </m:r>
+                            </m:sub>
+                          </m:sSub>
+                        </m:e>
+                      </m:acc>
+                      <m:r>
+                        <a:rPr lang="en-US" sz="1050" b="1" i="1">
+                          <a:latin typeface="Cambria Math" panose="02040503050406030204" pitchFamily="18" charset="0"/>
+                        </a:rPr>
+                        <m:t>(</m:t>
+                      </m:r>
+                      <m:r>
+                        <a:rPr lang="en-US" sz="1050" b="1" i="1">
+                          <a:latin typeface="Cambria Math" panose="02040503050406030204" pitchFamily="18" charset="0"/>
+                        </a:rPr>
+                        <m:t>𝒕</m:t>
+                      </m:r>
+                      <m:r>
+                        <a:rPr lang="en-US" sz="1050" b="1" i="1" smtClean="0">
+                          <a:latin typeface="Cambria Math" panose="02040503050406030204" pitchFamily="18" charset="0"/>
+                        </a:rPr>
+                        <m:t>+</m:t>
+                      </m:r>
+                      <m:r>
+                        <a:rPr lang="en-US" sz="1050" b="1" i="1" smtClean="0">
+                          <a:latin typeface="Cambria Math" panose="02040503050406030204" pitchFamily="18" charset="0"/>
+                        </a:rPr>
+                        <m:t>𝟏</m:t>
+                      </m:r>
+                      <m:r>
+                        <a:rPr lang="en-US" sz="1050" b="1">
+                          <a:latin typeface="Cambria Math" panose="02040503050406030204" pitchFamily="18" charset="0"/>
+                        </a:rPr>
+                        <m:t>)</m:t>
+                      </m:r>
+                    </m:oMath>
+                  </m:oMathPara>
+                </a14:m>
+                <a:endParaRPr lang="en-US" sz="1050" b="1" dirty="0"/>
+              </a:p>
             </p:txBody>
           </p:sp>
         </mc:Choice>
@@ -26885,7 +26861,7 @@
             <p:spPr>
               <a:xfrm>
                 <a:off x="7784256" y="3138049"/>
-                <a:ext cx="790345" cy="597279"/>
+                <a:ext cx="775918" cy="597279"/>
               </a:xfrm>
               <a:prstGeom prst="rect">
                 <a:avLst/>
@@ -26893,7 +26869,7 @@
               <a:blipFill>
                 <a:blip r:embed="rId5"/>
                 <a:stretch>
-                  <a:fillRect r="-769" b="-1020"/>
+                  <a:fillRect r="-2362" b="-1020"/>
                 </a:stretch>
               </a:blipFill>
             </p:spPr>
@@ -26929,8 +26905,8 @@
         </p:nvCxnSpPr>
         <p:spPr>
           <a:xfrm>
-            <a:off x="3950110" y="1968764"/>
-            <a:ext cx="405433" cy="3795"/>
+            <a:off x="3924847" y="1964917"/>
+            <a:ext cx="430696" cy="7642"/>
           </a:xfrm>
           <a:prstGeom prst="straightConnector1">
             <a:avLst/>
@@ -27134,8 +27110,8 @@
         </p:nvCxnSpPr>
         <p:spPr>
           <a:xfrm flipH="1">
-            <a:off x="7542446" y="1918386"/>
-            <a:ext cx="273271" cy="1521"/>
+            <a:off x="7542446" y="1914539"/>
+            <a:ext cx="273271" cy="5368"/>
           </a:xfrm>
           <a:prstGeom prst="straightConnector1">
             <a:avLst/>
@@ -27473,7 +27449,7 @@
             <p:spPr>
               <a:xfrm>
                 <a:off x="7784256" y="2710103"/>
-                <a:ext cx="790345" cy="253916"/>
+                <a:ext cx="549317" cy="253916"/>
               </a:xfrm>
               <a:prstGeom prst="rect">
                 <a:avLst/>
@@ -27546,18 +27522,6 @@
                         <a:rPr lang="en-US" sz="1050" b="1" i="1" smtClean="0">
                           <a:latin typeface="Cambria Math" panose="02040503050406030204" pitchFamily="18" charset="0"/>
                         </a:rPr>
-                        <m:t>−</m:t>
-                      </m:r>
-                      <m:r>
-                        <a:rPr lang="en-US" sz="1050" b="1" i="1" smtClean="0">
-                          <a:latin typeface="Cambria Math" panose="02040503050406030204" pitchFamily="18" charset="0"/>
-                        </a:rPr>
-                        <m:t>𝟏</m:t>
-                      </m:r>
-                      <m:r>
-                        <a:rPr lang="en-US" sz="1050" b="1" i="1" smtClean="0">
-                          <a:latin typeface="Cambria Math" panose="02040503050406030204" pitchFamily="18" charset="0"/>
-                        </a:rPr>
                         <m:t>)</m:t>
                       </m:r>
                     </m:oMath>
@@ -27586,7 +27550,7 @@
             <p:spPr>
               <a:xfrm>
                 <a:off x="7784256" y="2710103"/>
-                <a:ext cx="790345" cy="253916"/>
+                <a:ext cx="549317" cy="253916"/>
               </a:xfrm>
               <a:prstGeom prst="rect">
                 <a:avLst/>

</xml_diff>

<commit_message>
Update a minor on pipeline figure
</commit_message>
<xml_diff>
--- a/figures/pptx files/fig_DL_Pipeline.pptx
+++ b/figures/pptx files/fig_DL_Pipeline.pptx
@@ -25556,90 +25556,12 @@
           <a:chExt cx="0" cy="0"/>
         </a:xfrm>
       </p:grpSpPr>
-      <p:cxnSp>
-        <p:nvCxnSpPr>
-          <p:cNvPr id="13" name="Connector: Elbow 12">
+      <p:grpSp>
+        <p:nvGrpSpPr>
+          <p:cNvPr id="3" name="Group 2">
             <a:extLst>
               <a:ext uri="{FF2B5EF4-FFF2-40B4-BE49-F238E27FC236}">
-                <a16:creationId xmlns:a16="http://schemas.microsoft.com/office/drawing/2014/main" id="{0B6A2EA6-EAEA-475B-AF57-683D428378A9}"/>
-              </a:ext>
-            </a:extLst>
-          </p:cNvPr>
-          <p:cNvCxnSpPr>
-            <a:cxnSpLocks/>
-            <a:stCxn id="163" idx="2"/>
-            <a:endCxn id="308" idx="0"/>
-          </p:cNvCxnSpPr>
-          <p:nvPr/>
-        </p:nvCxnSpPr>
-        <p:spPr>
-          <a:xfrm rot="10800000" flipV="1">
-            <a:off x="6030712" y="1955978"/>
-            <a:ext cx="722369" cy="1206454"/>
-          </a:xfrm>
-          <a:prstGeom prst="bentConnector2">
-            <a:avLst/>
-          </a:prstGeom>
-          <a:ln>
-            <a:tailEnd type="triangle" w="sm" len="sm"/>
-          </a:ln>
-        </p:spPr>
-        <p:style>
-          <a:lnRef idx="1">
-            <a:schemeClr val="dk1"/>
-          </a:lnRef>
-          <a:fillRef idx="0">
-            <a:schemeClr val="dk1"/>
-          </a:fillRef>
-          <a:effectRef idx="0">
-            <a:schemeClr val="dk1"/>
-          </a:effectRef>
-          <a:fontRef idx="minor">
-            <a:schemeClr val="tx1"/>
-          </a:fontRef>
-        </p:style>
-      </p:cxnSp>
-      <p:sp>
-        <p:nvSpPr>
-          <p:cNvPr id="114" name="TextBox 113">
-            <a:extLst>
-              <a:ext uri="{FF2B5EF4-FFF2-40B4-BE49-F238E27FC236}">
-                <a16:creationId xmlns:a16="http://schemas.microsoft.com/office/drawing/2014/main" id="{9650CC5A-221B-43D4-8FC8-7D9C4724569D}"/>
-              </a:ext>
-            </a:extLst>
-          </p:cNvPr>
-          <p:cNvSpPr txBox="1"/>
-          <p:nvPr/>
-        </p:nvSpPr>
-        <p:spPr>
-          <a:xfrm>
-            <a:off x="3443796" y="2508785"/>
-            <a:ext cx="461665" cy="424155"/>
-          </a:xfrm>
-          <a:prstGeom prst="rect">
-            <a:avLst/>
-          </a:prstGeom>
-          <a:noFill/>
-        </p:spPr>
-        <p:txBody>
-          <a:bodyPr vert="eaVert" wrap="none" rtlCol="0">
-            <a:spAutoFit/>
-          </a:bodyPr>
-          <a:lstStyle/>
-          <a:p>
-            <a:r>
-              <a:rPr lang="en-US" dirty="0"/>
-              <a:t>. . . </a:t>
-            </a:r>
-          </a:p>
-        </p:txBody>
-      </p:sp>
-      <p:grpSp>
-        <p:nvGrpSpPr>
-          <p:cNvPr id="120" name="Group 119">
-            <a:extLst>
-              <a:ext uri="{FF2B5EF4-FFF2-40B4-BE49-F238E27FC236}">
-                <a16:creationId xmlns:a16="http://schemas.microsoft.com/office/drawing/2014/main" id="{10F5577F-C0C1-4245-97F5-50A64661A111}"/>
+                <a16:creationId xmlns:a16="http://schemas.microsoft.com/office/drawing/2014/main" id="{87CCA8A8-B4A4-44AB-861A-2CCC84ACD174}"/>
               </a:ext>
             </a:extLst>
           </p:cNvPr>
@@ -25648,18 +25570,942 @@
         </p:nvGrpSpPr>
         <p:grpSpPr>
           <a:xfrm>
-            <a:off x="4235111" y="1882381"/>
-            <a:ext cx="1023070" cy="393129"/>
-            <a:chOff x="3619847" y="1138392"/>
-            <a:chExt cx="983014" cy="393129"/>
+            <a:off x="3225040" y="1787581"/>
+            <a:ext cx="5420328" cy="2039987"/>
+            <a:chOff x="3225040" y="1787581"/>
+            <a:chExt cx="5420328" cy="2039987"/>
           </a:xfrm>
         </p:grpSpPr>
+        <p:cxnSp>
+          <p:nvCxnSpPr>
+            <p:cNvPr id="13" name="Connector: Elbow 12">
+              <a:extLst>
+                <a:ext uri="{FF2B5EF4-FFF2-40B4-BE49-F238E27FC236}">
+                  <a16:creationId xmlns:a16="http://schemas.microsoft.com/office/drawing/2014/main" id="{0B6A2EA6-EAEA-475B-AF57-683D428378A9}"/>
+                </a:ext>
+              </a:extLst>
+            </p:cNvPr>
+            <p:cNvCxnSpPr>
+              <a:cxnSpLocks/>
+              <a:stCxn id="163" idx="2"/>
+              <a:endCxn id="308" idx="0"/>
+            </p:cNvCxnSpPr>
+            <p:nvPr/>
+          </p:nvCxnSpPr>
+          <p:spPr>
+            <a:xfrm rot="10800000" flipV="1">
+              <a:off x="6030712" y="1955978"/>
+              <a:ext cx="722369" cy="1206454"/>
+            </a:xfrm>
+            <a:prstGeom prst="bentConnector2">
+              <a:avLst/>
+            </a:prstGeom>
+            <a:ln>
+              <a:tailEnd type="triangle" w="sm" len="sm"/>
+            </a:ln>
+          </p:spPr>
+          <p:style>
+            <a:lnRef idx="1">
+              <a:schemeClr val="dk1"/>
+            </a:lnRef>
+            <a:fillRef idx="0">
+              <a:schemeClr val="dk1"/>
+            </a:fillRef>
+            <a:effectRef idx="0">
+              <a:schemeClr val="dk1"/>
+            </a:effectRef>
+            <a:fontRef idx="minor">
+              <a:schemeClr val="tx1"/>
+            </a:fontRef>
+          </p:style>
+        </p:cxnSp>
         <p:sp>
           <p:nvSpPr>
-            <p:cNvPr id="234" name="Cube 233">
+            <p:cNvPr id="114" name="TextBox 113">
               <a:extLst>
                 <a:ext uri="{FF2B5EF4-FFF2-40B4-BE49-F238E27FC236}">
-                  <a16:creationId xmlns:a16="http://schemas.microsoft.com/office/drawing/2014/main" id="{D1930C1F-EBA7-480C-ABED-E54363609E97}"/>
+                  <a16:creationId xmlns:a16="http://schemas.microsoft.com/office/drawing/2014/main" id="{9650CC5A-221B-43D4-8FC8-7D9C4724569D}"/>
+                </a:ext>
+              </a:extLst>
+            </p:cNvPr>
+            <p:cNvSpPr txBox="1"/>
+            <p:nvPr/>
+          </p:nvSpPr>
+          <p:spPr>
+            <a:xfrm>
+              <a:off x="3443796" y="2508785"/>
+              <a:ext cx="461665" cy="424155"/>
+            </a:xfrm>
+            <a:prstGeom prst="rect">
+              <a:avLst/>
+            </a:prstGeom>
+            <a:noFill/>
+          </p:spPr>
+          <p:txBody>
+            <a:bodyPr vert="eaVert" wrap="none" rtlCol="0">
+              <a:spAutoFit/>
+            </a:bodyPr>
+            <a:lstStyle/>
+            <a:p>
+              <a:r>
+                <a:rPr lang="en-US" dirty="0"/>
+                <a:t>. . . </a:t>
+              </a:r>
+            </a:p>
+          </p:txBody>
+        </p:sp>
+        <p:grpSp>
+          <p:nvGrpSpPr>
+            <p:cNvPr id="120" name="Group 119">
+              <a:extLst>
+                <a:ext uri="{FF2B5EF4-FFF2-40B4-BE49-F238E27FC236}">
+                  <a16:creationId xmlns:a16="http://schemas.microsoft.com/office/drawing/2014/main" id="{10F5577F-C0C1-4245-97F5-50A64661A111}"/>
+                </a:ext>
+              </a:extLst>
+            </p:cNvPr>
+            <p:cNvGrpSpPr/>
+            <p:nvPr/>
+          </p:nvGrpSpPr>
+          <p:grpSpPr>
+            <a:xfrm>
+              <a:off x="4235111" y="1882381"/>
+              <a:ext cx="1023070" cy="393129"/>
+              <a:chOff x="3619847" y="1138392"/>
+              <a:chExt cx="983014" cy="393129"/>
+            </a:xfrm>
+          </p:grpSpPr>
+          <p:sp>
+            <p:nvSpPr>
+              <p:cNvPr id="234" name="Cube 233">
+                <a:extLst>
+                  <a:ext uri="{FF2B5EF4-FFF2-40B4-BE49-F238E27FC236}">
+                    <a16:creationId xmlns:a16="http://schemas.microsoft.com/office/drawing/2014/main" id="{D1930C1F-EBA7-480C-ABED-E54363609E97}"/>
+                  </a:ext>
+                </a:extLst>
+              </p:cNvPr>
+              <p:cNvSpPr/>
+              <p:nvPr/>
+            </p:nvSpPr>
+            <p:spPr>
+              <a:xfrm>
+                <a:off x="3735564" y="1138392"/>
+                <a:ext cx="789366" cy="144285"/>
+              </a:xfrm>
+              <a:prstGeom prst="cube">
+                <a:avLst/>
+              </a:prstGeom>
+              <a:solidFill>
+                <a:schemeClr val="accent4"/>
+              </a:solidFill>
+              <a:ln/>
+            </p:spPr>
+            <p:style>
+              <a:lnRef idx="2">
+                <a:schemeClr val="dk1"/>
+              </a:lnRef>
+              <a:fillRef idx="1">
+                <a:schemeClr val="lt1"/>
+              </a:fillRef>
+              <a:effectRef idx="0">
+                <a:schemeClr val="dk1"/>
+              </a:effectRef>
+              <a:fontRef idx="minor">
+                <a:schemeClr val="dk1"/>
+              </a:fontRef>
+            </p:style>
+            <p:txBody>
+              <a:bodyPr rtlCol="0" anchor="ctr"/>
+              <a:lstStyle/>
+              <a:p>
+                <a:pPr algn="ctr"/>
+                <a:endParaRPr lang="en-US"/>
+              </a:p>
+            </p:txBody>
+          </p:sp>
+          <p:sp>
+            <p:nvSpPr>
+              <p:cNvPr id="306" name="Rectangle 305">
+                <a:extLst>
+                  <a:ext uri="{FF2B5EF4-FFF2-40B4-BE49-F238E27FC236}">
+                    <a16:creationId xmlns:a16="http://schemas.microsoft.com/office/drawing/2014/main" id="{C08D40BF-2268-4780-B7F1-6734E3998A3D}"/>
+                  </a:ext>
+                </a:extLst>
+              </p:cNvPr>
+              <p:cNvSpPr/>
+              <p:nvPr/>
+            </p:nvSpPr>
+            <p:spPr>
+              <a:xfrm>
+                <a:off x="3619847" y="1277605"/>
+                <a:ext cx="983014" cy="253916"/>
+              </a:xfrm>
+              <a:prstGeom prst="rect">
+                <a:avLst/>
+              </a:prstGeom>
+            </p:spPr>
+            <p:txBody>
+              <a:bodyPr wrap="square">
+                <a:spAutoFit/>
+              </a:bodyPr>
+              <a:lstStyle/>
+              <a:p>
+                <a:pPr lvl="0" algn="ctr"/>
+                <a:r>
+                  <a:rPr lang="en-US" sz="1050" i="1" dirty="0" err="1">
+                    <a:solidFill>
+                      <a:prstClr val="black"/>
+                    </a:solidFill>
+                    <a:latin typeface="Arial" panose="020B0604020202020204" pitchFamily="34" charset="0"/>
+                    <a:cs typeface="Arial" panose="020B0604020202020204" pitchFamily="34" charset="0"/>
+                  </a:rPr>
+                  <a:t>HistEncLSTM</a:t>
+                </a:r>
+                <a:endParaRPr lang="en-US" sz="1050" i="1" dirty="0">
+                  <a:solidFill>
+                    <a:prstClr val="black"/>
+                  </a:solidFill>
+                  <a:latin typeface="Arial" panose="020B0604020202020204" pitchFamily="34" charset="0"/>
+                  <a:cs typeface="Arial" panose="020B0604020202020204" pitchFamily="34" charset="0"/>
+                </a:endParaRPr>
+              </a:p>
+            </p:txBody>
+          </p:sp>
+        </p:grpSp>
+        <p:grpSp>
+          <p:nvGrpSpPr>
+            <p:cNvPr id="121" name="Group 120">
+              <a:extLst>
+                <a:ext uri="{FF2B5EF4-FFF2-40B4-BE49-F238E27FC236}">
+                  <a16:creationId xmlns:a16="http://schemas.microsoft.com/office/drawing/2014/main" id="{C46CFC3F-A5A3-450C-AD5E-F375B6BBECCA}"/>
+                </a:ext>
+              </a:extLst>
+            </p:cNvPr>
+            <p:cNvGrpSpPr/>
+            <p:nvPr/>
+          </p:nvGrpSpPr>
+          <p:grpSpPr>
+            <a:xfrm>
+              <a:off x="4254003" y="3171522"/>
+              <a:ext cx="1023070" cy="391483"/>
+              <a:chOff x="3598683" y="3601515"/>
+              <a:chExt cx="1023070" cy="391483"/>
+            </a:xfrm>
+          </p:grpSpPr>
+          <p:sp>
+            <p:nvSpPr>
+              <p:cNvPr id="263" name="Cube 262">
+                <a:extLst>
+                  <a:ext uri="{FF2B5EF4-FFF2-40B4-BE49-F238E27FC236}">
+                    <a16:creationId xmlns:a16="http://schemas.microsoft.com/office/drawing/2014/main" id="{3A7368E3-A23A-4674-B676-512E295DDFF0}"/>
+                  </a:ext>
+                </a:extLst>
+              </p:cNvPr>
+              <p:cNvSpPr/>
+              <p:nvPr/>
+            </p:nvSpPr>
+            <p:spPr>
+              <a:xfrm>
+                <a:off x="3735564" y="3601515"/>
+                <a:ext cx="789366" cy="144285"/>
+              </a:xfrm>
+              <a:prstGeom prst="cube">
+                <a:avLst/>
+              </a:prstGeom>
+              <a:solidFill>
+                <a:schemeClr val="accent4"/>
+              </a:solidFill>
+              <a:ln/>
+            </p:spPr>
+            <p:style>
+              <a:lnRef idx="2">
+                <a:schemeClr val="dk1"/>
+              </a:lnRef>
+              <a:fillRef idx="1">
+                <a:schemeClr val="lt1"/>
+              </a:fillRef>
+              <a:effectRef idx="0">
+                <a:schemeClr val="dk1"/>
+              </a:effectRef>
+              <a:fontRef idx="minor">
+                <a:schemeClr val="dk1"/>
+              </a:fontRef>
+            </p:style>
+            <p:txBody>
+              <a:bodyPr rtlCol="0" anchor="ctr"/>
+              <a:lstStyle/>
+              <a:p>
+                <a:pPr algn="ctr"/>
+                <a:endParaRPr lang="en-US"/>
+              </a:p>
+            </p:txBody>
+          </p:sp>
+          <p:sp>
+            <p:nvSpPr>
+              <p:cNvPr id="307" name="Rectangle 306">
+                <a:extLst>
+                  <a:ext uri="{FF2B5EF4-FFF2-40B4-BE49-F238E27FC236}">
+                    <a16:creationId xmlns:a16="http://schemas.microsoft.com/office/drawing/2014/main" id="{3342BF31-D23B-4DC7-B32F-D080FCF25C14}"/>
+                  </a:ext>
+                </a:extLst>
+              </p:cNvPr>
+              <p:cNvSpPr/>
+              <p:nvPr/>
+            </p:nvSpPr>
+            <p:spPr>
+              <a:xfrm>
+                <a:off x="3598683" y="3739082"/>
+                <a:ext cx="1023070" cy="253916"/>
+              </a:xfrm>
+              <a:prstGeom prst="rect">
+                <a:avLst/>
+              </a:prstGeom>
+            </p:spPr>
+            <p:txBody>
+              <a:bodyPr wrap="square">
+                <a:spAutoFit/>
+              </a:bodyPr>
+              <a:lstStyle/>
+              <a:p>
+                <a:pPr lvl="0" algn="ctr"/>
+                <a:r>
+                  <a:rPr lang="en-US" sz="1050" i="1" dirty="0" err="1">
+                    <a:solidFill>
+                      <a:prstClr val="black"/>
+                    </a:solidFill>
+                    <a:latin typeface="Arial" panose="020B0604020202020204" pitchFamily="34" charset="0"/>
+                    <a:cs typeface="Arial" panose="020B0604020202020204" pitchFamily="34" charset="0"/>
+                  </a:rPr>
+                  <a:t>HistEncLSTM</a:t>
+                </a:r>
+                <a:endParaRPr lang="en-US" sz="1050" i="1" dirty="0">
+                  <a:solidFill>
+                    <a:prstClr val="black"/>
+                  </a:solidFill>
+                  <a:latin typeface="Arial" panose="020B0604020202020204" pitchFamily="34" charset="0"/>
+                  <a:cs typeface="Arial" panose="020B0604020202020204" pitchFamily="34" charset="0"/>
+                </a:endParaRPr>
+              </a:p>
+            </p:txBody>
+          </p:sp>
+        </p:grpSp>
+        <p:grpSp>
+          <p:nvGrpSpPr>
+            <p:cNvPr id="329" name="Group 328">
+              <a:extLst>
+                <a:ext uri="{FF2B5EF4-FFF2-40B4-BE49-F238E27FC236}">
+                  <a16:creationId xmlns:a16="http://schemas.microsoft.com/office/drawing/2014/main" id="{15C90D8A-248E-462D-A424-104F88AB72F0}"/>
+                </a:ext>
+              </a:extLst>
+            </p:cNvPr>
+            <p:cNvGrpSpPr/>
+            <p:nvPr/>
+          </p:nvGrpSpPr>
+          <p:grpSpPr>
+            <a:xfrm>
+              <a:off x="5521168" y="3162432"/>
+              <a:ext cx="983014" cy="386923"/>
+              <a:chOff x="5567613" y="2920874"/>
+              <a:chExt cx="983014" cy="386923"/>
+            </a:xfrm>
+          </p:grpSpPr>
+          <p:sp>
+            <p:nvSpPr>
+              <p:cNvPr id="308" name="Cube 307">
+                <a:extLst>
+                  <a:ext uri="{FF2B5EF4-FFF2-40B4-BE49-F238E27FC236}">
+                    <a16:creationId xmlns:a16="http://schemas.microsoft.com/office/drawing/2014/main" id="{3C2E4CC1-C76D-4122-9D4D-CAE4E7CA48A1}"/>
+                  </a:ext>
+                </a:extLst>
+              </p:cNvPr>
+              <p:cNvSpPr/>
+              <p:nvPr/>
+            </p:nvSpPr>
+            <p:spPr>
+              <a:xfrm>
+                <a:off x="5664437" y="2920874"/>
+                <a:ext cx="789366" cy="144285"/>
+              </a:xfrm>
+              <a:prstGeom prst="cube">
+                <a:avLst/>
+              </a:prstGeom>
+              <a:solidFill>
+                <a:srgbClr val="92D050"/>
+              </a:solidFill>
+              <a:ln/>
+            </p:spPr>
+            <p:style>
+              <a:lnRef idx="2">
+                <a:schemeClr val="dk1"/>
+              </a:lnRef>
+              <a:fillRef idx="1">
+                <a:schemeClr val="lt1"/>
+              </a:fillRef>
+              <a:effectRef idx="0">
+                <a:schemeClr val="dk1"/>
+              </a:effectRef>
+              <a:fontRef idx="minor">
+                <a:schemeClr val="dk1"/>
+              </a:fontRef>
+            </p:style>
+            <p:txBody>
+              <a:bodyPr rtlCol="0" anchor="ctr"/>
+              <a:lstStyle/>
+              <a:p>
+                <a:pPr algn="ctr"/>
+                <a:endParaRPr lang="en-US"/>
+              </a:p>
+            </p:txBody>
+          </p:sp>
+          <p:sp>
+            <p:nvSpPr>
+              <p:cNvPr id="328" name="Rectangle 327">
+                <a:extLst>
+                  <a:ext uri="{FF2B5EF4-FFF2-40B4-BE49-F238E27FC236}">
+                    <a16:creationId xmlns:a16="http://schemas.microsoft.com/office/drawing/2014/main" id="{C44CC823-6D55-41AC-9103-EFC34FAE50C1}"/>
+                  </a:ext>
+                </a:extLst>
+              </p:cNvPr>
+              <p:cNvSpPr/>
+              <p:nvPr/>
+            </p:nvSpPr>
+            <p:spPr>
+              <a:xfrm>
+                <a:off x="5567613" y="3053881"/>
+                <a:ext cx="983014" cy="253916"/>
+              </a:xfrm>
+              <a:prstGeom prst="rect">
+                <a:avLst/>
+              </a:prstGeom>
+            </p:spPr>
+            <p:txBody>
+              <a:bodyPr wrap="square">
+                <a:spAutoFit/>
+              </a:bodyPr>
+              <a:lstStyle/>
+              <a:p>
+                <a:pPr lvl="0" algn="ctr"/>
+                <a:r>
+                  <a:rPr lang="en-US" sz="1050" i="1" dirty="0" err="1">
+                    <a:solidFill>
+                      <a:prstClr val="black"/>
+                    </a:solidFill>
+                    <a:latin typeface="Arial" panose="020B0604020202020204" pitchFamily="34" charset="0"/>
+                    <a:cs typeface="Arial" panose="020B0604020202020204" pitchFamily="34" charset="0"/>
+                  </a:rPr>
+                  <a:t>FusionFC</a:t>
+                </a:r>
+                <a:endParaRPr lang="en-US" sz="1050" i="1" dirty="0">
+                  <a:solidFill>
+                    <a:prstClr val="black"/>
+                  </a:solidFill>
+                  <a:latin typeface="Arial" panose="020B0604020202020204" pitchFamily="34" charset="0"/>
+                  <a:cs typeface="Arial" panose="020B0604020202020204" pitchFamily="34" charset="0"/>
+                </a:endParaRPr>
+              </a:p>
+            </p:txBody>
+          </p:sp>
+        </p:grpSp>
+        <p:grpSp>
+          <p:nvGrpSpPr>
+            <p:cNvPr id="337" name="Group 336">
+              <a:extLst>
+                <a:ext uri="{FF2B5EF4-FFF2-40B4-BE49-F238E27FC236}">
+                  <a16:creationId xmlns:a16="http://schemas.microsoft.com/office/drawing/2014/main" id="{BB1603FD-0CDB-4CAB-BAC7-01838C518A35}"/>
+                </a:ext>
+              </a:extLst>
+            </p:cNvPr>
+            <p:cNvGrpSpPr/>
+            <p:nvPr/>
+          </p:nvGrpSpPr>
+          <p:grpSpPr>
+            <a:xfrm>
+              <a:off x="6665363" y="2787234"/>
+              <a:ext cx="983014" cy="438395"/>
+              <a:chOff x="2406800" y="4049300"/>
+              <a:chExt cx="983014" cy="438395"/>
+            </a:xfrm>
+          </p:grpSpPr>
+          <p:sp>
+            <p:nvSpPr>
+              <p:cNvPr id="338" name="Cube 337">
+                <a:extLst>
+                  <a:ext uri="{FF2B5EF4-FFF2-40B4-BE49-F238E27FC236}">
+                    <a16:creationId xmlns:a16="http://schemas.microsoft.com/office/drawing/2014/main" id="{08F536EA-81B5-4C3E-AF7D-C428CA013231}"/>
+                  </a:ext>
+                </a:extLst>
+              </p:cNvPr>
+              <p:cNvSpPr/>
+              <p:nvPr/>
+            </p:nvSpPr>
+            <p:spPr>
+              <a:xfrm>
+                <a:off x="2494517" y="4049300"/>
+                <a:ext cx="789366" cy="144285"/>
+              </a:xfrm>
+              <a:prstGeom prst="cube">
+                <a:avLst/>
+              </a:prstGeom>
+              <a:solidFill>
+                <a:srgbClr val="FF0000"/>
+              </a:solidFill>
+              <a:ln/>
+            </p:spPr>
+            <p:style>
+              <a:lnRef idx="2">
+                <a:schemeClr val="dk1"/>
+              </a:lnRef>
+              <a:fillRef idx="1">
+                <a:schemeClr val="lt1"/>
+              </a:fillRef>
+              <a:effectRef idx="0">
+                <a:schemeClr val="dk1"/>
+              </a:effectRef>
+              <a:fontRef idx="minor">
+                <a:schemeClr val="dk1"/>
+              </a:fontRef>
+            </p:style>
+            <p:txBody>
+              <a:bodyPr rtlCol="0" anchor="ctr"/>
+              <a:lstStyle/>
+              <a:p>
+                <a:pPr algn="ctr"/>
+                <a:endParaRPr lang="en-US"/>
+              </a:p>
+            </p:txBody>
+          </p:sp>
+          <p:sp>
+            <p:nvSpPr>
+              <p:cNvPr id="339" name="Rectangle 338">
+                <a:extLst>
+                  <a:ext uri="{FF2B5EF4-FFF2-40B4-BE49-F238E27FC236}">
+                    <a16:creationId xmlns:a16="http://schemas.microsoft.com/office/drawing/2014/main" id="{55FCD7A3-B6BE-4B92-9EB3-051F8A2B89BA}"/>
+                  </a:ext>
+                </a:extLst>
+              </p:cNvPr>
+              <p:cNvSpPr/>
+              <p:nvPr/>
+            </p:nvSpPr>
+            <p:spPr>
+              <a:xfrm>
+                <a:off x="2406800" y="4233779"/>
+                <a:ext cx="983014" cy="253916"/>
+              </a:xfrm>
+              <a:prstGeom prst="rect">
+                <a:avLst/>
+              </a:prstGeom>
+            </p:spPr>
+            <p:txBody>
+              <a:bodyPr wrap="square">
+                <a:spAutoFit/>
+              </a:bodyPr>
+              <a:lstStyle/>
+              <a:p>
+                <a:pPr lvl="0" algn="ctr"/>
+                <a:r>
+                  <a:rPr lang="en-US" sz="1050" i="1" dirty="0" err="1">
+                    <a:solidFill>
+                      <a:prstClr val="black"/>
+                    </a:solidFill>
+                    <a:latin typeface="Arial" panose="020B0604020202020204" pitchFamily="34" charset="0"/>
+                    <a:cs typeface="Arial" panose="020B0604020202020204" pitchFamily="34" charset="0"/>
+                  </a:rPr>
+                  <a:t>PDecFC</a:t>
+                </a:r>
+                <a:endParaRPr lang="en-US" sz="1050" i="1" dirty="0">
+                  <a:solidFill>
+                    <a:prstClr val="black"/>
+                  </a:solidFill>
+                  <a:latin typeface="Arial" panose="020B0604020202020204" pitchFamily="34" charset="0"/>
+                  <a:cs typeface="Arial" panose="020B0604020202020204" pitchFamily="34" charset="0"/>
+                </a:endParaRPr>
+              </a:p>
+            </p:txBody>
+          </p:sp>
+        </p:grpSp>
+        <mc:AlternateContent xmlns:mc="http://schemas.openxmlformats.org/markup-compatibility/2006">
+          <mc:Choice xmlns:a14="http://schemas.microsoft.com/office/drawing/2010/main" Requires="a14">
+            <p:sp>
+              <p:nvSpPr>
+                <p:cNvPr id="398" name="TextBox 397">
+                  <a:extLst>
+                    <a:ext uri="{FF2B5EF4-FFF2-40B4-BE49-F238E27FC236}">
+                      <a16:creationId xmlns:a16="http://schemas.microsoft.com/office/drawing/2014/main" id="{6162F011-46BD-4B84-A32D-209235B4154E}"/>
+                    </a:ext>
+                  </a:extLst>
+                </p:cNvPr>
+                <p:cNvSpPr txBox="1"/>
+                <p:nvPr/>
+              </p:nvSpPr>
+              <p:spPr>
+                <a:xfrm>
+                  <a:off x="7815717" y="1787581"/>
+                  <a:ext cx="829651" cy="253916"/>
+                </a:xfrm>
+                <a:prstGeom prst="rect">
+                  <a:avLst/>
+                </a:prstGeom>
+                <a:noFill/>
+              </p:spPr>
+              <p:txBody>
+                <a:bodyPr wrap="none" rtlCol="0">
+                  <a:spAutoFit/>
+                </a:bodyPr>
+                <a:lstStyle/>
+                <a:p>
+                  <a:pPr/>
+                  <a14:m>
+                    <m:oMathPara xmlns:m="http://schemas.openxmlformats.org/officeDocument/2006/math">
+                      <m:oMathParaPr>
+                        <m:jc m:val="centerGroup"/>
+                      </m:oMathParaPr>
+                      <m:oMath xmlns:m="http://schemas.openxmlformats.org/officeDocument/2006/math">
+                        <m:r>
+                          <a:rPr lang="en-US" sz="1050" b="1" i="1" smtClean="0">
+                            <a:latin typeface="Cambria Math" panose="02040503050406030204" pitchFamily="18" charset="0"/>
+                          </a:rPr>
+                          <m:t>𝑶</m:t>
+                        </m:r>
+                        <m:r>
+                          <a:rPr lang="en-US" sz="1050" b="1" i="1" smtClean="0">
+                            <a:latin typeface="Cambria Math" panose="02040503050406030204" pitchFamily="18" charset="0"/>
+                          </a:rPr>
+                          <m:t>(</m:t>
+                        </m:r>
+                        <m:r>
+                          <a:rPr lang="en-US" sz="1050" b="1" i="1" smtClean="0">
+                            <a:latin typeface="Cambria Math" panose="02040503050406030204" pitchFamily="18" charset="0"/>
+                          </a:rPr>
+                          <m:t>𝒕</m:t>
+                        </m:r>
+                        <m:r>
+                          <a:rPr lang="en-US" sz="1050" b="1" i="1" smtClean="0">
+                            <a:latin typeface="Cambria Math" panose="02040503050406030204" pitchFamily="18" charset="0"/>
+                          </a:rPr>
+                          <m:t>, </m:t>
+                        </m:r>
+                        <m:r>
+                          <a:rPr lang="en-US" sz="1050" b="1" i="1" smtClean="0">
+                            <a:latin typeface="Cambria Math" panose="02040503050406030204" pitchFamily="18" charset="0"/>
+                          </a:rPr>
+                          <m:t>𝒕</m:t>
+                        </m:r>
+                        <m:r>
+                          <a:rPr lang="en-US" sz="1050" b="1" i="1" smtClean="0">
+                            <a:latin typeface="Cambria Math" panose="02040503050406030204" pitchFamily="18" charset="0"/>
+                          </a:rPr>
+                          <m:t>+</m:t>
+                        </m:r>
+                        <m:r>
+                          <a:rPr lang="en-US" sz="1050" b="1" i="1" smtClean="0">
+                            <a:latin typeface="Cambria Math" panose="02040503050406030204" pitchFamily="18" charset="0"/>
+                          </a:rPr>
+                          <m:t>𝟏</m:t>
+                        </m:r>
+                        <m:r>
+                          <a:rPr lang="en-US" sz="1050" b="1" i="0" smtClean="0">
+                            <a:latin typeface="Cambria Math" panose="02040503050406030204" pitchFamily="18" charset="0"/>
+                          </a:rPr>
+                          <m:t>)</m:t>
+                        </m:r>
+                      </m:oMath>
+                    </m:oMathPara>
+                  </a14:m>
+                  <a:endParaRPr lang="en-US" sz="1050" b="1" dirty="0"/>
+                </a:p>
+              </p:txBody>
+            </p:sp>
+          </mc:Choice>
+          <mc:Fallback>
+            <p:sp>
+              <p:nvSpPr>
+                <p:cNvPr id="398" name="TextBox 397">
+                  <a:extLst>
+                    <a:ext uri="{FF2B5EF4-FFF2-40B4-BE49-F238E27FC236}">
+                      <a16:creationId xmlns:a16="http://schemas.microsoft.com/office/drawing/2014/main" id="{6162F011-46BD-4B84-A32D-209235B4154E}"/>
+                    </a:ext>
+                  </a:extLst>
+                </p:cNvPr>
+                <p:cNvSpPr txBox="1">
+                  <a:spLocks noRot="1" noChangeAspect="1" noMove="1" noResize="1" noEditPoints="1" noAdjustHandles="1" noChangeArrowheads="1" noChangeShapeType="1" noTextEdit="1"/>
+                </p:cNvSpPr>
+                <p:nvPr/>
+              </p:nvSpPr>
+              <p:spPr>
+                <a:xfrm>
+                  <a:off x="7815717" y="1787581"/>
+                  <a:ext cx="829651" cy="253916"/>
+                </a:xfrm>
+                <a:prstGeom prst="rect">
+                  <a:avLst/>
+                </a:prstGeom>
+                <a:blipFill>
+                  <a:blip r:embed="rId2"/>
+                  <a:stretch>
+                    <a:fillRect b="-7143"/>
+                  </a:stretch>
+                </a:blipFill>
+              </p:spPr>
+              <p:txBody>
+                <a:bodyPr/>
+                <a:lstStyle/>
+                <a:p>
+                  <a:r>
+                    <a:rPr lang="en-US">
+                      <a:noFill/>
+                    </a:rPr>
+                    <a:t> </a:t>
+                  </a:r>
+                </a:p>
+              </p:txBody>
+            </p:sp>
+          </mc:Fallback>
+        </mc:AlternateContent>
+        <mc:AlternateContent xmlns:mc="http://schemas.openxmlformats.org/markup-compatibility/2006">
+          <mc:Choice xmlns:a14="http://schemas.microsoft.com/office/drawing/2010/main" Requires="a14">
+            <p:sp>
+              <p:nvSpPr>
+                <p:cNvPr id="399" name="TextBox 398">
+                  <a:extLst>
+                    <a:ext uri="{FF2B5EF4-FFF2-40B4-BE49-F238E27FC236}">
+                      <a16:creationId xmlns:a16="http://schemas.microsoft.com/office/drawing/2014/main" id="{BC3866E9-6561-4E64-9C02-B38EDEC67EA1}"/>
+                    </a:ext>
+                  </a:extLst>
+                </p:cNvPr>
+                <p:cNvSpPr txBox="1"/>
+                <p:nvPr/>
+              </p:nvSpPr>
+              <p:spPr>
+                <a:xfrm>
+                  <a:off x="3226732" y="3161550"/>
+                  <a:ext cx="709425" cy="253916"/>
+                </a:xfrm>
+                <a:prstGeom prst="rect">
+                  <a:avLst/>
+                </a:prstGeom>
+                <a:noFill/>
+              </p:spPr>
+              <p:txBody>
+                <a:bodyPr wrap="none" rtlCol="0">
+                  <a:spAutoFit/>
+                </a:bodyPr>
+                <a:lstStyle/>
+                <a:p>
+                  <a:pPr/>
+                  <a14:m>
+                    <m:oMathPara xmlns:m="http://schemas.openxmlformats.org/officeDocument/2006/math">
+                      <m:oMathParaPr>
+                        <m:jc m:val="centerGroup"/>
+                      </m:oMathParaPr>
+                      <m:oMath xmlns:m="http://schemas.openxmlformats.org/officeDocument/2006/math">
+                        <m:r>
+                          <a:rPr lang="en-US" sz="1050" b="1" i="1" smtClean="0">
+                            <a:latin typeface="Cambria Math" panose="02040503050406030204" pitchFamily="18" charset="0"/>
+                          </a:rPr>
+                          <m:t>𝒉</m:t>
+                        </m:r>
+                        <m:r>
+                          <a:rPr lang="en-US" sz="1050" b="1" i="1" smtClean="0">
+                            <a:latin typeface="Cambria Math" panose="02040503050406030204" pitchFamily="18" charset="0"/>
+                          </a:rPr>
+                          <m:t>(</m:t>
+                        </m:r>
+                        <m:r>
+                          <a:rPr lang="en-US" sz="1050" b="1" i="1" smtClean="0">
+                            <a:latin typeface="Cambria Math" panose="02040503050406030204" pitchFamily="18" charset="0"/>
+                          </a:rPr>
+                          <m:t>𝒕</m:t>
+                        </m:r>
+                        <m:r>
+                          <a:rPr lang="en-US" sz="1050" b="1" i="1" smtClean="0">
+                            <a:latin typeface="Cambria Math" panose="02040503050406030204" pitchFamily="18" charset="0"/>
+                          </a:rPr>
+                          <m:t>−</m:t>
+                        </m:r>
+                        <m:r>
+                          <a:rPr lang="en-US" sz="1050" b="1" i="1" smtClean="0">
+                            <a:latin typeface="Cambria Math" panose="02040503050406030204" pitchFamily="18" charset="0"/>
+                          </a:rPr>
+                          <m:t>𝟏</m:t>
+                        </m:r>
+                        <m:r>
+                          <a:rPr lang="en-US" sz="1050" b="1" i="1" smtClean="0">
+                            <a:latin typeface="Cambria Math" panose="02040503050406030204" pitchFamily="18" charset="0"/>
+                          </a:rPr>
+                          <m:t>)</m:t>
+                        </m:r>
+                      </m:oMath>
+                    </m:oMathPara>
+                  </a14:m>
+                  <a:endParaRPr lang="en-US" sz="1050" b="1" dirty="0"/>
+                </a:p>
+              </p:txBody>
+            </p:sp>
+          </mc:Choice>
+          <mc:Fallback>
+            <p:sp>
+              <p:nvSpPr>
+                <p:cNvPr id="399" name="TextBox 398">
+                  <a:extLst>
+                    <a:ext uri="{FF2B5EF4-FFF2-40B4-BE49-F238E27FC236}">
+                      <a16:creationId xmlns:a16="http://schemas.microsoft.com/office/drawing/2014/main" id="{BC3866E9-6561-4E64-9C02-B38EDEC67EA1}"/>
+                    </a:ext>
+                  </a:extLst>
+                </p:cNvPr>
+                <p:cNvSpPr txBox="1">
+                  <a:spLocks noRot="1" noChangeAspect="1" noMove="1" noResize="1" noEditPoints="1" noAdjustHandles="1" noChangeArrowheads="1" noChangeShapeType="1" noTextEdit="1"/>
+                </p:cNvSpPr>
+                <p:nvPr/>
+              </p:nvSpPr>
+              <p:spPr>
+                <a:xfrm>
+                  <a:off x="3226732" y="3161550"/>
+                  <a:ext cx="709425" cy="253916"/>
+                </a:xfrm>
+                <a:prstGeom prst="rect">
+                  <a:avLst/>
+                </a:prstGeom>
+                <a:blipFill>
+                  <a:blip r:embed="rId3"/>
+                  <a:stretch>
+                    <a:fillRect b="-7317"/>
+                  </a:stretch>
+                </a:blipFill>
+              </p:spPr>
+              <p:txBody>
+                <a:bodyPr/>
+                <a:lstStyle/>
+                <a:p>
+                  <a:r>
+                    <a:rPr lang="en-US">
+                      <a:noFill/>
+                    </a:rPr>
+                    <a:t> </a:t>
+                  </a:r>
+                </a:p>
+              </p:txBody>
+            </p:sp>
+          </mc:Fallback>
+        </mc:AlternateContent>
+        <mc:AlternateContent xmlns:mc="http://schemas.openxmlformats.org/markup-compatibility/2006">
+          <mc:Choice xmlns:a14="http://schemas.microsoft.com/office/drawing/2010/main" Requires="a14">
+            <p:sp>
+              <p:nvSpPr>
+                <p:cNvPr id="400" name="TextBox 399">
+                  <a:extLst>
+                    <a:ext uri="{FF2B5EF4-FFF2-40B4-BE49-F238E27FC236}">
+                      <a16:creationId xmlns:a16="http://schemas.microsoft.com/office/drawing/2014/main" id="{C085BE11-4A2C-4BFC-A7AD-1F98EBBB5F54}"/>
+                    </a:ext>
+                  </a:extLst>
+                </p:cNvPr>
+                <p:cNvSpPr txBox="1"/>
+                <p:nvPr/>
+              </p:nvSpPr>
+              <p:spPr>
+                <a:xfrm>
+                  <a:off x="3225040" y="1837959"/>
+                  <a:ext cx="699807" cy="253916"/>
+                </a:xfrm>
+                <a:prstGeom prst="rect">
+                  <a:avLst/>
+                </a:prstGeom>
+                <a:noFill/>
+              </p:spPr>
+              <p:txBody>
+                <a:bodyPr wrap="none" rtlCol="0">
+                  <a:spAutoFit/>
+                </a:bodyPr>
+                <a:lstStyle/>
+                <a:p>
+                  <a:pPr/>
+                  <a14:m>
+                    <m:oMathPara xmlns:m="http://schemas.openxmlformats.org/officeDocument/2006/math">
+                      <m:oMathParaPr>
+                        <m:jc m:val="centerGroup"/>
+                      </m:oMathParaPr>
+                      <m:oMath xmlns:m="http://schemas.openxmlformats.org/officeDocument/2006/math">
+                        <m:r>
+                          <a:rPr lang="en-US" sz="1050" b="1" i="1" smtClean="0">
+                            <a:latin typeface="Cambria Math" panose="02040503050406030204" pitchFamily="18" charset="0"/>
+                          </a:rPr>
+                          <m:t>𝒉</m:t>
+                        </m:r>
+                        <m:r>
+                          <a:rPr lang="en-US" sz="1050" b="1" i="1" smtClean="0">
+                            <a:latin typeface="Cambria Math" panose="02040503050406030204" pitchFamily="18" charset="0"/>
+                          </a:rPr>
+                          <m:t>(</m:t>
+                        </m:r>
+                        <m:r>
+                          <a:rPr lang="en-US" sz="1050" b="1" i="1" smtClean="0">
+                            <a:latin typeface="Cambria Math" panose="02040503050406030204" pitchFamily="18" charset="0"/>
+                          </a:rPr>
+                          <m:t>𝒕</m:t>
+                        </m:r>
+                        <m:r>
+                          <a:rPr lang="en-US" sz="1050" b="1" i="1" smtClean="0">
+                            <a:latin typeface="Cambria Math" panose="02040503050406030204" pitchFamily="18" charset="0"/>
+                          </a:rPr>
+                          <m:t>−ℓ)</m:t>
+                        </m:r>
+                      </m:oMath>
+                    </m:oMathPara>
+                  </a14:m>
+                  <a:endParaRPr lang="en-US" sz="1050" b="1" dirty="0"/>
+                </a:p>
+              </p:txBody>
+            </p:sp>
+          </mc:Choice>
+          <mc:Fallback>
+            <p:sp>
+              <p:nvSpPr>
+                <p:cNvPr id="400" name="TextBox 399">
+                  <a:extLst>
+                    <a:ext uri="{FF2B5EF4-FFF2-40B4-BE49-F238E27FC236}">
+                      <a16:creationId xmlns:a16="http://schemas.microsoft.com/office/drawing/2014/main" id="{C085BE11-4A2C-4BFC-A7AD-1F98EBBB5F54}"/>
+                    </a:ext>
+                  </a:extLst>
+                </p:cNvPr>
+                <p:cNvSpPr txBox="1">
+                  <a:spLocks noRot="1" noChangeAspect="1" noMove="1" noResize="1" noEditPoints="1" noAdjustHandles="1" noChangeArrowheads="1" noChangeShapeType="1" noTextEdit="1"/>
+                </p:cNvSpPr>
+                <p:nvPr/>
+              </p:nvSpPr>
+              <p:spPr>
+                <a:xfrm>
+                  <a:off x="3225040" y="1837959"/>
+                  <a:ext cx="699807" cy="253916"/>
+                </a:xfrm>
+                <a:prstGeom prst="rect">
+                  <a:avLst/>
+                </a:prstGeom>
+                <a:blipFill>
+                  <a:blip r:embed="rId4"/>
+                  <a:stretch>
+                    <a:fillRect b="-7317"/>
+                  </a:stretch>
+                </a:blipFill>
+              </p:spPr>
+              <p:txBody>
+                <a:bodyPr/>
+                <a:lstStyle/>
+                <a:p>
+                  <a:r>
+                    <a:rPr lang="en-US">
+                      <a:noFill/>
+                    </a:rPr>
+                    <a:t> </a:t>
+                  </a:r>
+                </a:p>
+              </p:txBody>
+            </p:sp>
+          </mc:Fallback>
+        </mc:AlternateContent>
+        <p:sp>
+          <p:nvSpPr>
+            <p:cNvPr id="316" name="Oval 315">
+              <a:extLst>
+                <a:ext uri="{FF2B5EF4-FFF2-40B4-BE49-F238E27FC236}">
+                  <a16:creationId xmlns:a16="http://schemas.microsoft.com/office/drawing/2014/main" id="{50A9C40C-48F3-4808-BA31-13745677202B}"/>
                 </a:ext>
               </a:extLst>
             </p:cNvPr>
@@ -25668,2007 +26514,1182 @@
           </p:nvSpPr>
           <p:spPr>
             <a:xfrm>
-              <a:off x="3735564" y="1138392"/>
-              <a:ext cx="789366" cy="144285"/>
+              <a:off x="5903533" y="2578775"/>
+              <a:ext cx="254356" cy="194756"/>
             </a:xfrm>
-            <a:prstGeom prst="cube">
+            <a:prstGeom prst="ellipse">
               <a:avLst/>
             </a:prstGeom>
             <a:solidFill>
-              <a:schemeClr val="accent4"/>
+              <a:schemeClr val="bg1">
+                <a:lumMod val="85000"/>
+              </a:schemeClr>
             </a:solidFill>
-            <a:ln/>
+            <a:ln w="6350">
+              <a:solidFill>
+                <a:schemeClr val="tx1"/>
+              </a:solidFill>
+            </a:ln>
           </p:spPr>
           <p:style>
             <a:lnRef idx="2">
+              <a:schemeClr val="accent1">
+                <a:shade val="50000"/>
+              </a:schemeClr>
+            </a:lnRef>
+            <a:fillRef idx="1">
+              <a:schemeClr val="accent1"/>
+            </a:fillRef>
+            <a:effectRef idx="0">
+              <a:schemeClr val="accent1"/>
+            </a:effectRef>
+            <a:fontRef idx="minor">
+              <a:schemeClr val="lt1"/>
+            </a:fontRef>
+          </p:style>
+          <p:txBody>
+            <a:bodyPr lIns="0" tIns="0" rIns="0" bIns="0" rtlCol="0" anchor="ctr">
+              <a:spAutoFit/>
+            </a:bodyPr>
+            <a:lstStyle/>
+            <a:p>
+              <a:pPr algn="ctr"/>
+              <a:r>
+                <a:rPr lang="en-US" sz="900" dirty="0">
+                  <a:ln w="0"/>
+                  <a:solidFill>
+                    <a:schemeClr val="tx1"/>
+                  </a:solidFill>
+                  <a:effectLst>
+                    <a:outerShdw blurRad="38100" dist="19050" dir="2700000" algn="tl" rotWithShape="0">
+                      <a:schemeClr val="dk1">
+                        <a:alpha val="40000"/>
+                      </a:schemeClr>
+                    </a:outerShdw>
+                  </a:effectLst>
+                </a:rPr>
+                <a:t>+</a:t>
+              </a:r>
+            </a:p>
+          </p:txBody>
+        </p:sp>
+        <p:cxnSp>
+          <p:nvCxnSpPr>
+            <p:cNvPr id="10" name="Connector: Elbow 9">
+              <a:extLst>
+                <a:ext uri="{FF2B5EF4-FFF2-40B4-BE49-F238E27FC236}">
+                  <a16:creationId xmlns:a16="http://schemas.microsoft.com/office/drawing/2014/main" id="{D59BFA37-6E21-4ACA-ABA9-65A4A83E04AC}"/>
+                </a:ext>
+              </a:extLst>
+            </p:cNvPr>
+            <p:cNvCxnSpPr>
+              <a:cxnSpLocks/>
+              <a:stCxn id="234" idx="5"/>
+              <a:endCxn id="263" idx="5"/>
+            </p:cNvCxnSpPr>
+            <p:nvPr/>
+          </p:nvCxnSpPr>
+          <p:spPr>
+            <a:xfrm>
+              <a:off x="5177074" y="1936488"/>
+              <a:ext cx="3176" cy="1289141"/>
+            </a:xfrm>
+            <a:prstGeom prst="bentConnector3">
+              <a:avLst>
+                <a:gd name="adj1" fmla="val 7297733"/>
+              </a:avLst>
+            </a:prstGeom>
+          </p:spPr>
+          <p:style>
+            <a:lnRef idx="1">
               <a:schemeClr val="dk1"/>
             </a:lnRef>
-            <a:fillRef idx="1">
-              <a:schemeClr val="lt1"/>
+            <a:fillRef idx="0">
+              <a:schemeClr val="dk1"/>
             </a:fillRef>
             <a:effectRef idx="0">
               <a:schemeClr val="dk1"/>
             </a:effectRef>
             <a:fontRef idx="minor">
-              <a:schemeClr val="dk1"/>
+              <a:schemeClr val="tx1"/>
             </a:fontRef>
           </p:style>
-          <p:txBody>
-            <a:bodyPr rtlCol="0" anchor="ctr"/>
-            <a:lstStyle/>
-            <a:p>
-              <a:pPr algn="ctr"/>
-              <a:endParaRPr lang="en-US"/>
-            </a:p>
-          </p:txBody>
-        </p:sp>
-        <p:sp>
-          <p:nvSpPr>
-            <p:cNvPr id="306" name="Rectangle 305">
+        </p:cxnSp>
+        <mc:AlternateContent xmlns:mc="http://schemas.openxmlformats.org/markup-compatibility/2006">
+          <mc:Choice xmlns:a14="http://schemas.microsoft.com/office/drawing/2010/main" Requires="a14">
+            <p:sp>
+              <p:nvSpPr>
+                <p:cNvPr id="172" name="TextBox 171">
+                  <a:extLst>
+                    <a:ext uri="{FF2B5EF4-FFF2-40B4-BE49-F238E27FC236}">
+                      <a16:creationId xmlns:a16="http://schemas.microsoft.com/office/drawing/2014/main" id="{E907155D-B1F3-4FB2-A4D3-FC66D417D516}"/>
+                    </a:ext>
+                  </a:extLst>
+                </p:cNvPr>
+                <p:cNvSpPr txBox="1"/>
+                <p:nvPr/>
+              </p:nvSpPr>
+              <p:spPr>
+                <a:xfrm>
+                  <a:off x="7784256" y="3138049"/>
+                  <a:ext cx="775918" cy="597279"/>
+                </a:xfrm>
+                <a:prstGeom prst="rect">
+                  <a:avLst/>
+                </a:prstGeom>
+                <a:noFill/>
+              </p:spPr>
+              <p:txBody>
+                <a:bodyPr wrap="none" rtlCol="0">
+                  <a:spAutoFit/>
+                </a:bodyPr>
+                <a:lstStyle/>
+                <a:p>
+                  <a:pPr/>
+                  <a14:m>
+                    <m:oMathPara xmlns:m="http://schemas.openxmlformats.org/officeDocument/2006/math">
+                      <m:oMathParaPr>
+                        <m:jc m:val="centerGroup"/>
+                      </m:oMathParaPr>
+                      <m:oMath xmlns:m="http://schemas.openxmlformats.org/officeDocument/2006/math">
+                        <m:acc>
+                          <m:accPr>
+                            <m:chr m:val="̂"/>
+                            <m:ctrlPr>
+                              <a:rPr lang="en-US" sz="1050" b="1" i="1" smtClean="0">
+                                <a:latin typeface="Cambria Math" panose="02040503050406030204" pitchFamily="18" charset="0"/>
+                              </a:rPr>
+                            </m:ctrlPr>
+                          </m:accPr>
+                          <m:e>
+                            <m:sSub>
+                              <m:sSubPr>
+                                <m:ctrlPr>
+                                  <a:rPr lang="en-US" sz="1050" b="1" i="1" smtClean="0">
+                                    <a:latin typeface="Cambria Math" panose="02040503050406030204" pitchFamily="18" charset="0"/>
+                                  </a:rPr>
+                                </m:ctrlPr>
+                              </m:sSubPr>
+                              <m:e>
+                                <m:r>
+                                  <a:rPr lang="en-US" sz="1050" b="1" i="1" smtClean="0">
+                                    <a:latin typeface="Cambria Math" panose="02040503050406030204" pitchFamily="18" charset="0"/>
+                                  </a:rPr>
+                                  <m:t>𝜽</m:t>
+                                </m:r>
+                              </m:e>
+                              <m:sub>
+                                <m:r>
+                                  <a:rPr lang="en-US" sz="1050" b="1" i="1" smtClean="0">
+                                    <a:latin typeface="Cambria Math" panose="02040503050406030204" pitchFamily="18" charset="0"/>
+                                  </a:rPr>
+                                  <m:t>𝑯</m:t>
+                                </m:r>
+                              </m:sub>
+                            </m:sSub>
+                          </m:e>
+                        </m:acc>
+                        <m:r>
+                          <a:rPr lang="en-US" sz="1050" b="1" i="1" smtClean="0">
+                            <a:latin typeface="Cambria Math" panose="02040503050406030204" pitchFamily="18" charset="0"/>
+                          </a:rPr>
+                          <m:t>(</m:t>
+                        </m:r>
+                        <m:r>
+                          <a:rPr lang="en-US" sz="1050" b="1" i="1" smtClean="0">
+                            <a:latin typeface="Cambria Math" panose="02040503050406030204" pitchFamily="18" charset="0"/>
+                          </a:rPr>
+                          <m:t>𝒕</m:t>
+                        </m:r>
+                        <m:r>
+                          <a:rPr lang="en-US" sz="1050" b="1" i="0" smtClean="0">
+                            <a:latin typeface="Cambria Math" panose="02040503050406030204" pitchFamily="18" charset="0"/>
+                          </a:rPr>
+                          <m:t>)</m:t>
+                        </m:r>
+                      </m:oMath>
+                    </m:oMathPara>
+                  </a14:m>
+                  <a:endParaRPr lang="en-US" sz="1050" b="1" dirty="0"/>
+                </a:p>
+                <a:p>
+                  <a:pPr/>
+                  <a14:m>
+                    <m:oMathPara xmlns:m="http://schemas.openxmlformats.org/officeDocument/2006/math">
+                      <m:oMathParaPr>
+                        <m:jc m:val="centerGroup"/>
+                      </m:oMathParaPr>
+                      <m:oMath xmlns:m="http://schemas.openxmlformats.org/officeDocument/2006/math">
+                        <m:acc>
+                          <m:accPr>
+                            <m:chr m:val="̂"/>
+                            <m:ctrlPr>
+                              <a:rPr lang="en-US" sz="1050" b="1" i="1" smtClean="0">
+                                <a:latin typeface="Cambria Math" panose="02040503050406030204" pitchFamily="18" charset="0"/>
+                              </a:rPr>
+                            </m:ctrlPr>
+                          </m:accPr>
+                          <m:e>
+                            <m:sSub>
+                              <m:sSubPr>
+                                <m:ctrlPr>
+                                  <a:rPr lang="en-US" sz="1050" b="1" i="1" smtClean="0">
+                                    <a:latin typeface="Cambria Math" panose="02040503050406030204" pitchFamily="18" charset="0"/>
+                                  </a:rPr>
+                                </m:ctrlPr>
+                              </m:sSubPr>
+                              <m:e>
+                                <m:r>
+                                  <a:rPr lang="en-US" sz="1050" b="1" i="1" smtClean="0">
+                                    <a:latin typeface="Cambria Math" panose="02040503050406030204" pitchFamily="18" charset="0"/>
+                                  </a:rPr>
+                                  <m:t>𝜽</m:t>
+                                </m:r>
+                              </m:e>
+                              <m:sub>
+                                <m:r>
+                                  <a:rPr lang="en-US" sz="1050" b="1" i="1" smtClean="0">
+                                    <a:latin typeface="Cambria Math" panose="02040503050406030204" pitchFamily="18" charset="0"/>
+                                  </a:rPr>
+                                  <m:t>𝑭</m:t>
+                                </m:r>
+                              </m:sub>
+                            </m:sSub>
+                          </m:e>
+                        </m:acc>
+                        <m:r>
+                          <a:rPr lang="en-US" sz="1050" b="1" i="1">
+                            <a:latin typeface="Cambria Math" panose="02040503050406030204" pitchFamily="18" charset="0"/>
+                          </a:rPr>
+                          <m:t>(</m:t>
+                        </m:r>
+                        <m:r>
+                          <a:rPr lang="en-US" sz="1050" b="1" i="1">
+                            <a:latin typeface="Cambria Math" panose="02040503050406030204" pitchFamily="18" charset="0"/>
+                          </a:rPr>
+                          <m:t>𝒕</m:t>
+                        </m:r>
+                        <m:r>
+                          <a:rPr lang="en-US" sz="1050" b="1">
+                            <a:latin typeface="Cambria Math" panose="02040503050406030204" pitchFamily="18" charset="0"/>
+                          </a:rPr>
+                          <m:t>)</m:t>
+                        </m:r>
+                      </m:oMath>
+                    </m:oMathPara>
+                  </a14:m>
+                  <a:endParaRPr lang="en-US" sz="1050" b="1" dirty="0"/>
+                </a:p>
+                <a:p>
+                  <a:pPr/>
+                  <a14:m>
+                    <m:oMathPara xmlns:m="http://schemas.openxmlformats.org/officeDocument/2006/math">
+                      <m:oMathParaPr>
+                        <m:jc m:val="centerGroup"/>
+                      </m:oMathParaPr>
+                      <m:oMath xmlns:m="http://schemas.openxmlformats.org/officeDocument/2006/math">
+                        <m:acc>
+                          <m:accPr>
+                            <m:chr m:val="̂"/>
+                            <m:ctrlPr>
+                              <a:rPr lang="en-US" sz="1050" b="1" i="1" smtClean="0">
+                                <a:latin typeface="Cambria Math" panose="02040503050406030204" pitchFamily="18" charset="0"/>
+                              </a:rPr>
+                            </m:ctrlPr>
+                          </m:accPr>
+                          <m:e>
+                            <m:sSub>
+                              <m:sSubPr>
+                                <m:ctrlPr>
+                                  <a:rPr lang="en-US" sz="1050" b="1" i="1" smtClean="0">
+                                    <a:latin typeface="Cambria Math" panose="02040503050406030204" pitchFamily="18" charset="0"/>
+                                  </a:rPr>
+                                </m:ctrlPr>
+                              </m:sSubPr>
+                              <m:e>
+                                <m:r>
+                                  <a:rPr lang="en-US" sz="1050" b="1" i="1" smtClean="0">
+                                    <a:latin typeface="Cambria Math" panose="02040503050406030204" pitchFamily="18" charset="0"/>
+                                  </a:rPr>
+                                  <m:t>𝜽</m:t>
+                                </m:r>
+                              </m:e>
+                              <m:sub>
+                                <m:r>
+                                  <a:rPr lang="en-US" sz="1050" b="1" i="1" smtClean="0">
+                                    <a:latin typeface="Cambria Math" panose="02040503050406030204" pitchFamily="18" charset="0"/>
+                                  </a:rPr>
+                                  <m:t>𝑭</m:t>
+                                </m:r>
+                              </m:sub>
+                            </m:sSub>
+                          </m:e>
+                        </m:acc>
+                        <m:r>
+                          <a:rPr lang="en-US" sz="1050" b="1" i="1">
+                            <a:latin typeface="Cambria Math" panose="02040503050406030204" pitchFamily="18" charset="0"/>
+                          </a:rPr>
+                          <m:t>(</m:t>
+                        </m:r>
+                        <m:r>
+                          <a:rPr lang="en-US" sz="1050" b="1" i="1">
+                            <a:latin typeface="Cambria Math" panose="02040503050406030204" pitchFamily="18" charset="0"/>
+                          </a:rPr>
+                          <m:t>𝒕</m:t>
+                        </m:r>
+                        <m:r>
+                          <a:rPr lang="en-US" sz="1050" b="1" i="1" smtClean="0">
+                            <a:latin typeface="Cambria Math" panose="02040503050406030204" pitchFamily="18" charset="0"/>
+                          </a:rPr>
+                          <m:t>+</m:t>
+                        </m:r>
+                        <m:r>
+                          <a:rPr lang="en-US" sz="1050" b="1" i="1" smtClean="0">
+                            <a:latin typeface="Cambria Math" panose="02040503050406030204" pitchFamily="18" charset="0"/>
+                          </a:rPr>
+                          <m:t>𝟏</m:t>
+                        </m:r>
+                        <m:r>
+                          <a:rPr lang="en-US" sz="1050" b="1">
+                            <a:latin typeface="Cambria Math" panose="02040503050406030204" pitchFamily="18" charset="0"/>
+                          </a:rPr>
+                          <m:t>)</m:t>
+                        </m:r>
+                      </m:oMath>
+                    </m:oMathPara>
+                  </a14:m>
+                  <a:endParaRPr lang="en-US" sz="1050" b="1" dirty="0"/>
+                </a:p>
+              </p:txBody>
+            </p:sp>
+          </mc:Choice>
+          <mc:Fallback>
+            <p:sp>
+              <p:nvSpPr>
+                <p:cNvPr id="172" name="TextBox 171">
+                  <a:extLst>
+                    <a:ext uri="{FF2B5EF4-FFF2-40B4-BE49-F238E27FC236}">
+                      <a16:creationId xmlns:a16="http://schemas.microsoft.com/office/drawing/2014/main" id="{E907155D-B1F3-4FB2-A4D3-FC66D417D516}"/>
+                    </a:ext>
+                  </a:extLst>
+                </p:cNvPr>
+                <p:cNvSpPr txBox="1">
+                  <a:spLocks noRot="1" noChangeAspect="1" noMove="1" noResize="1" noEditPoints="1" noAdjustHandles="1" noChangeArrowheads="1" noChangeShapeType="1" noTextEdit="1"/>
+                </p:cNvSpPr>
+                <p:nvPr/>
+              </p:nvSpPr>
+              <p:spPr>
+                <a:xfrm>
+                  <a:off x="7784256" y="3138049"/>
+                  <a:ext cx="775918" cy="597279"/>
+                </a:xfrm>
+                <a:prstGeom prst="rect">
+                  <a:avLst/>
+                </a:prstGeom>
+                <a:blipFill>
+                  <a:blip r:embed="rId5"/>
+                  <a:stretch>
+                    <a:fillRect r="-2362" b="-1020"/>
+                  </a:stretch>
+                </a:blipFill>
+              </p:spPr>
+              <p:txBody>
+                <a:bodyPr/>
+                <a:lstStyle/>
+                <a:p>
+                  <a:r>
+                    <a:rPr lang="en-US">
+                      <a:noFill/>
+                    </a:rPr>
+                    <a:t> </a:t>
+                  </a:r>
+                </a:p>
+              </p:txBody>
+            </p:sp>
+          </mc:Fallback>
+        </mc:AlternateContent>
+        <p:cxnSp>
+          <p:nvCxnSpPr>
+            <p:cNvPr id="4" name="Straight Arrow Connector 3">
               <a:extLst>
                 <a:ext uri="{FF2B5EF4-FFF2-40B4-BE49-F238E27FC236}">
-                  <a16:creationId xmlns:a16="http://schemas.microsoft.com/office/drawing/2014/main" id="{C08D40BF-2268-4780-B7F1-6734E3998A3D}"/>
+                  <a16:creationId xmlns:a16="http://schemas.microsoft.com/office/drawing/2014/main" id="{2B5C7469-B725-4B1E-8AA2-5409897309A7}"/>
                 </a:ext>
               </a:extLst>
             </p:cNvPr>
-            <p:cNvSpPr/>
+            <p:cNvCxnSpPr>
+              <a:stCxn id="400" idx="3"/>
+              <a:endCxn id="234" idx="2"/>
+            </p:cNvCxnSpPr>
             <p:nvPr/>
-          </p:nvSpPr>
+          </p:nvCxnSpPr>
           <p:spPr>
             <a:xfrm>
-              <a:off x="3619847" y="1277605"/>
-              <a:ext cx="983014" cy="253916"/>
+              <a:off x="3924847" y="1964917"/>
+              <a:ext cx="430696" cy="7642"/>
             </a:xfrm>
-            <a:prstGeom prst="rect">
+            <a:prstGeom prst="straightConnector1">
               <a:avLst/>
             </a:prstGeom>
+            <a:ln w="6350">
+              <a:solidFill>
+                <a:schemeClr val="tx1"/>
+              </a:solidFill>
+              <a:tailEnd type="triangle" w="sm" len="sm"/>
+            </a:ln>
           </p:spPr>
-          <p:txBody>
-            <a:bodyPr wrap="square">
-              <a:spAutoFit/>
-            </a:bodyPr>
-            <a:lstStyle/>
-            <a:p>
-              <a:pPr lvl="0" algn="ctr"/>
-              <a:r>
-                <a:rPr lang="en-US" sz="1050" i="1" dirty="0" err="1">
+          <p:style>
+            <a:lnRef idx="1">
+              <a:schemeClr val="accent1"/>
+            </a:lnRef>
+            <a:fillRef idx="0">
+              <a:schemeClr val="accent1"/>
+            </a:fillRef>
+            <a:effectRef idx="0">
+              <a:schemeClr val="accent1"/>
+            </a:effectRef>
+            <a:fontRef idx="minor">
+              <a:schemeClr val="tx1"/>
+            </a:fontRef>
+          </p:style>
+        </p:cxnSp>
+        <p:cxnSp>
+          <p:nvCxnSpPr>
+            <p:cNvPr id="161" name="Straight Arrow Connector 160">
+              <a:extLst>
+                <a:ext uri="{FF2B5EF4-FFF2-40B4-BE49-F238E27FC236}">
+                  <a16:creationId xmlns:a16="http://schemas.microsoft.com/office/drawing/2014/main" id="{1C56799C-BC9A-4C95-9842-136A3C35ADDB}"/>
+                </a:ext>
+              </a:extLst>
+            </p:cNvPr>
+            <p:cNvCxnSpPr/>
+            <p:nvPr/>
+          </p:nvCxnSpPr>
+          <p:spPr>
+            <a:xfrm flipV="1">
+              <a:off x="3984731" y="3273772"/>
+              <a:ext cx="393453" cy="3900"/>
+            </a:xfrm>
+            <a:prstGeom prst="straightConnector1">
+              <a:avLst/>
+            </a:prstGeom>
+            <a:ln w="6350">
+              <a:solidFill>
+                <a:schemeClr val="tx1"/>
+              </a:solidFill>
+              <a:tailEnd type="triangle" w="sm" len="sm"/>
+            </a:ln>
+          </p:spPr>
+          <p:style>
+            <a:lnRef idx="1">
+              <a:schemeClr val="accent1"/>
+            </a:lnRef>
+            <a:fillRef idx="0">
+              <a:schemeClr val="accent1"/>
+            </a:fillRef>
+            <a:effectRef idx="0">
+              <a:schemeClr val="accent1"/>
+            </a:effectRef>
+            <a:fontRef idx="minor">
+              <a:schemeClr val="tx1"/>
+            </a:fontRef>
+          </p:style>
+        </p:cxnSp>
+        <p:grpSp>
+          <p:nvGrpSpPr>
+            <p:cNvPr id="162" name="Group 161">
+              <a:extLst>
+                <a:ext uri="{FF2B5EF4-FFF2-40B4-BE49-F238E27FC236}">
+                  <a16:creationId xmlns:a16="http://schemas.microsoft.com/office/drawing/2014/main" id="{456544E6-20AD-44ED-9B7A-7831D3057B2D}"/>
+                </a:ext>
+              </a:extLst>
+            </p:cNvPr>
+            <p:cNvGrpSpPr/>
+            <p:nvPr/>
+          </p:nvGrpSpPr>
+          <p:grpSpPr>
+            <a:xfrm>
+              <a:off x="6665363" y="1865800"/>
+              <a:ext cx="983014" cy="438395"/>
+              <a:chOff x="2406800" y="4049300"/>
+              <a:chExt cx="983014" cy="438395"/>
+            </a:xfrm>
+          </p:grpSpPr>
+          <p:sp>
+            <p:nvSpPr>
+              <p:cNvPr id="163" name="Cube 162">
+                <a:extLst>
+                  <a:ext uri="{FF2B5EF4-FFF2-40B4-BE49-F238E27FC236}">
+                    <a16:creationId xmlns:a16="http://schemas.microsoft.com/office/drawing/2014/main" id="{8E431827-8B6E-4C87-9762-511533252170}"/>
+                  </a:ext>
+                </a:extLst>
+              </p:cNvPr>
+              <p:cNvSpPr/>
+              <p:nvPr/>
+            </p:nvSpPr>
+            <p:spPr>
+              <a:xfrm>
+                <a:off x="2494517" y="4049300"/>
+                <a:ext cx="789366" cy="144285"/>
+              </a:xfrm>
+              <a:prstGeom prst="cube">
+                <a:avLst/>
+              </a:prstGeom>
+              <a:solidFill>
+                <a:srgbClr val="00B0F0"/>
+              </a:solidFill>
+              <a:ln/>
+            </p:spPr>
+            <p:style>
+              <a:lnRef idx="2">
+                <a:schemeClr val="dk1"/>
+              </a:lnRef>
+              <a:fillRef idx="1">
+                <a:schemeClr val="lt1"/>
+              </a:fillRef>
+              <a:effectRef idx="0">
+                <a:schemeClr val="dk1"/>
+              </a:effectRef>
+              <a:fontRef idx="minor">
+                <a:schemeClr val="dk1"/>
+              </a:fontRef>
+            </p:style>
+            <p:txBody>
+              <a:bodyPr rtlCol="0" anchor="ctr"/>
+              <a:lstStyle/>
+              <a:p>
+                <a:pPr algn="ctr"/>
+                <a:endParaRPr lang="en-US"/>
+              </a:p>
+            </p:txBody>
+          </p:sp>
+          <p:sp>
+            <p:nvSpPr>
+              <p:cNvPr id="164" name="Rectangle 163">
+                <a:extLst>
+                  <a:ext uri="{FF2B5EF4-FFF2-40B4-BE49-F238E27FC236}">
+                    <a16:creationId xmlns:a16="http://schemas.microsoft.com/office/drawing/2014/main" id="{9BE0F158-E686-462B-AC91-8B6AC5D0C1E1}"/>
+                  </a:ext>
+                </a:extLst>
+              </p:cNvPr>
+              <p:cNvSpPr/>
+              <p:nvPr/>
+            </p:nvSpPr>
+            <p:spPr>
+              <a:xfrm>
+                <a:off x="2406800" y="4233779"/>
+                <a:ext cx="983014" cy="253916"/>
+              </a:xfrm>
+              <a:prstGeom prst="rect">
+                <a:avLst/>
+              </a:prstGeom>
+            </p:spPr>
+            <p:txBody>
+              <a:bodyPr wrap="square">
+                <a:spAutoFit/>
+              </a:bodyPr>
+              <a:lstStyle/>
+              <a:p>
+                <a:pPr lvl="0" algn="ctr"/>
+                <a:r>
+                  <a:rPr lang="en-US" sz="1050" i="1" dirty="0" err="1">
+                    <a:solidFill>
+                      <a:prstClr val="black"/>
+                    </a:solidFill>
+                    <a:latin typeface="Arial" panose="020B0604020202020204" pitchFamily="34" charset="0"/>
+                    <a:cs typeface="Arial" panose="020B0604020202020204" pitchFamily="34" charset="0"/>
+                  </a:rPr>
+                  <a:t>ObsEncFC</a:t>
+                </a:r>
+                <a:endParaRPr lang="en-US" sz="1050" i="1" dirty="0">
                   <a:solidFill>
                     <a:prstClr val="black"/>
                   </a:solidFill>
                   <a:latin typeface="Arial" panose="020B0604020202020204" pitchFamily="34" charset="0"/>
                   <a:cs typeface="Arial" panose="020B0604020202020204" pitchFamily="34" charset="0"/>
-                </a:rPr>
-                <a:t>HistEncLSTM</a:t>
-              </a:r>
-              <a:endParaRPr lang="en-US" sz="1050" i="1" dirty="0">
-                <a:solidFill>
-                  <a:prstClr val="black"/>
-                </a:solidFill>
-                <a:latin typeface="Arial" panose="020B0604020202020204" pitchFamily="34" charset="0"/>
-                <a:cs typeface="Arial" panose="020B0604020202020204" pitchFamily="34" charset="0"/>
-              </a:endParaRPr>
-            </a:p>
-          </p:txBody>
-        </p:sp>
-      </p:grpSp>
-      <p:grpSp>
-        <p:nvGrpSpPr>
-          <p:cNvPr id="121" name="Group 120">
-            <a:extLst>
-              <a:ext uri="{FF2B5EF4-FFF2-40B4-BE49-F238E27FC236}">
-                <a16:creationId xmlns:a16="http://schemas.microsoft.com/office/drawing/2014/main" id="{C46CFC3F-A5A3-450C-AD5E-F375B6BBECCA}"/>
-              </a:ext>
-            </a:extLst>
-          </p:cNvPr>
-          <p:cNvGrpSpPr/>
-          <p:nvPr/>
-        </p:nvGrpSpPr>
-        <p:grpSpPr>
-          <a:xfrm>
-            <a:off x="4254003" y="3171522"/>
-            <a:ext cx="1023070" cy="391483"/>
-            <a:chOff x="3598683" y="3601515"/>
-            <a:chExt cx="1023070" cy="391483"/>
-          </a:xfrm>
-        </p:grpSpPr>
-        <p:sp>
-          <p:nvSpPr>
-            <p:cNvPr id="263" name="Cube 262">
+                </a:endParaRPr>
+              </a:p>
+            </p:txBody>
+          </p:sp>
+        </p:grpSp>
+        <p:cxnSp>
+          <p:nvCxnSpPr>
+            <p:cNvPr id="169" name="Straight Arrow Connector 168">
               <a:extLst>
                 <a:ext uri="{FF2B5EF4-FFF2-40B4-BE49-F238E27FC236}">
-                  <a16:creationId xmlns:a16="http://schemas.microsoft.com/office/drawing/2014/main" id="{3A7368E3-A23A-4674-B676-512E295DDFF0}"/>
+                  <a16:creationId xmlns:a16="http://schemas.microsoft.com/office/drawing/2014/main" id="{3FD37AD2-5055-4750-AB55-9B7384F256B0}"/>
                 </a:ext>
               </a:extLst>
             </p:cNvPr>
-            <p:cNvSpPr/>
+            <p:cNvCxnSpPr>
+              <a:cxnSpLocks/>
+              <a:stCxn id="398" idx="1"/>
+              <a:endCxn id="163" idx="5"/>
+            </p:cNvCxnSpPr>
             <p:nvPr/>
-          </p:nvSpPr>
+          </p:nvCxnSpPr>
           <p:spPr>
-            <a:xfrm>
-              <a:off x="3735564" y="3601515"/>
-              <a:ext cx="789366" cy="144285"/>
+            <a:xfrm flipH="1">
+              <a:off x="7542446" y="1914539"/>
+              <a:ext cx="273271" cy="5368"/>
             </a:xfrm>
-            <a:prstGeom prst="cube">
+            <a:prstGeom prst="straightConnector1">
               <a:avLst/>
             </a:prstGeom>
-            <a:solidFill>
-              <a:schemeClr val="accent4"/>
-            </a:solidFill>
-            <a:ln/>
+            <a:ln w="6350">
+              <a:solidFill>
+                <a:schemeClr val="tx1"/>
+              </a:solidFill>
+              <a:tailEnd type="triangle" w="sm" len="sm"/>
+            </a:ln>
           </p:spPr>
           <p:style>
-            <a:lnRef idx="2">
-              <a:schemeClr val="dk1"/>
+            <a:lnRef idx="1">
+              <a:schemeClr val="accent1"/>
             </a:lnRef>
-            <a:fillRef idx="1">
-              <a:schemeClr val="lt1"/>
+            <a:fillRef idx="0">
+              <a:schemeClr val="accent1"/>
             </a:fillRef>
             <a:effectRef idx="0">
-              <a:schemeClr val="dk1"/>
+              <a:schemeClr val="accent1"/>
             </a:effectRef>
             <a:fontRef idx="minor">
-              <a:schemeClr val="dk1"/>
+              <a:schemeClr val="tx1"/>
             </a:fontRef>
           </p:style>
-          <p:txBody>
-            <a:bodyPr rtlCol="0" anchor="ctr"/>
-            <a:lstStyle/>
-            <a:p>
-              <a:pPr algn="ctr"/>
-              <a:endParaRPr lang="en-US"/>
-            </a:p>
-          </p:txBody>
-        </p:sp>
-        <p:sp>
-          <p:nvSpPr>
-            <p:cNvPr id="307" name="Rectangle 306">
+        </p:cxnSp>
+        <p:grpSp>
+          <p:nvGrpSpPr>
+            <p:cNvPr id="173" name="Group 172">
               <a:extLst>
                 <a:ext uri="{FF2B5EF4-FFF2-40B4-BE49-F238E27FC236}">
-                  <a16:creationId xmlns:a16="http://schemas.microsoft.com/office/drawing/2014/main" id="{3342BF31-D23B-4DC7-B32F-D080FCF25C14}"/>
+                  <a16:creationId xmlns:a16="http://schemas.microsoft.com/office/drawing/2014/main" id="{2AA61D2A-C466-4EF0-9EEC-907687B35DCE}"/>
                 </a:ext>
               </a:extLst>
             </p:cNvPr>
-            <p:cNvSpPr/>
+            <p:cNvGrpSpPr/>
             <p:nvPr/>
-          </p:nvSpPr>
-          <p:spPr>
+          </p:nvGrpSpPr>
+          <p:grpSpPr>
             <a:xfrm>
-              <a:off x="3598683" y="3739082"/>
-              <a:ext cx="1023070" cy="253916"/>
+              <a:off x="6661819" y="3389173"/>
+              <a:ext cx="983014" cy="438395"/>
+              <a:chOff x="2406800" y="4049300"/>
+              <a:chExt cx="983014" cy="438395"/>
             </a:xfrm>
-            <a:prstGeom prst="rect">
-              <a:avLst/>
-            </a:prstGeom>
-          </p:spPr>
-          <p:txBody>
-            <a:bodyPr wrap="square">
-              <a:spAutoFit/>
-            </a:bodyPr>
-            <a:lstStyle/>
-            <a:p>
-              <a:pPr lvl="0" algn="ctr"/>
-              <a:r>
-                <a:rPr lang="en-US" sz="1050" i="1" dirty="0" err="1">
+          </p:grpSpPr>
+          <p:sp>
+            <p:nvSpPr>
+              <p:cNvPr id="174" name="Cube 173">
+                <a:extLst>
+                  <a:ext uri="{FF2B5EF4-FFF2-40B4-BE49-F238E27FC236}">
+                    <a16:creationId xmlns:a16="http://schemas.microsoft.com/office/drawing/2014/main" id="{84FA9FB2-FE8D-4B39-9CEF-F6CA7DF7F8D6}"/>
+                  </a:ext>
+                </a:extLst>
+              </p:cNvPr>
+              <p:cNvSpPr/>
+              <p:nvPr/>
+            </p:nvSpPr>
+            <p:spPr>
+              <a:xfrm>
+                <a:off x="2494517" y="4049300"/>
+                <a:ext cx="789366" cy="144285"/>
+              </a:xfrm>
+              <a:prstGeom prst="cube">
+                <a:avLst/>
+              </a:prstGeom>
+              <a:solidFill>
+                <a:srgbClr val="7030A0"/>
+              </a:solidFill>
+              <a:ln/>
+            </p:spPr>
+            <p:style>
+              <a:lnRef idx="2">
+                <a:schemeClr val="dk1"/>
+              </a:lnRef>
+              <a:fillRef idx="1">
+                <a:schemeClr val="lt1"/>
+              </a:fillRef>
+              <a:effectRef idx="0">
+                <a:schemeClr val="dk1"/>
+              </a:effectRef>
+              <a:fontRef idx="minor">
+                <a:schemeClr val="dk1"/>
+              </a:fontRef>
+            </p:style>
+            <p:txBody>
+              <a:bodyPr rtlCol="0" anchor="ctr"/>
+              <a:lstStyle/>
+              <a:p>
+                <a:pPr algn="ctr"/>
+                <a:endParaRPr lang="en-US"/>
+              </a:p>
+            </p:txBody>
+          </p:sp>
+          <p:sp>
+            <p:nvSpPr>
+              <p:cNvPr id="175" name="Rectangle 174">
+                <a:extLst>
+                  <a:ext uri="{FF2B5EF4-FFF2-40B4-BE49-F238E27FC236}">
+                    <a16:creationId xmlns:a16="http://schemas.microsoft.com/office/drawing/2014/main" id="{909EB882-A041-48E9-9057-3EE815BD674D}"/>
+                  </a:ext>
+                </a:extLst>
+              </p:cNvPr>
+              <p:cNvSpPr/>
+              <p:nvPr/>
+            </p:nvSpPr>
+            <p:spPr>
+              <a:xfrm>
+                <a:off x="2406800" y="4233779"/>
+                <a:ext cx="983014" cy="253916"/>
+              </a:xfrm>
+              <a:prstGeom prst="rect">
+                <a:avLst/>
+              </a:prstGeom>
+            </p:spPr>
+            <p:txBody>
+              <a:bodyPr wrap="square">
+                <a:spAutoFit/>
+              </a:bodyPr>
+              <a:lstStyle/>
+              <a:p>
+                <a:pPr lvl="0" algn="ctr"/>
+                <a:r>
+                  <a:rPr lang="en-US" sz="1050" i="1" dirty="0" err="1">
+                    <a:solidFill>
+                      <a:prstClr val="black"/>
+                    </a:solidFill>
+                    <a:latin typeface="Arial" panose="020B0604020202020204" pitchFamily="34" charset="0"/>
+                    <a:cs typeface="Arial" panose="020B0604020202020204" pitchFamily="34" charset="0"/>
+                  </a:rPr>
+                  <a:t>ODecFC</a:t>
+                </a:r>
+                <a:endParaRPr lang="en-US" sz="1050" i="1" dirty="0">
                   <a:solidFill>
                     <a:prstClr val="black"/>
                   </a:solidFill>
                   <a:latin typeface="Arial" panose="020B0604020202020204" pitchFamily="34" charset="0"/>
                   <a:cs typeface="Arial" panose="020B0604020202020204" pitchFamily="34" charset="0"/>
-                </a:rPr>
-                <a:t>HistEncLSTM</a:t>
-              </a:r>
-              <a:endParaRPr lang="en-US" sz="1050" i="1" dirty="0">
-                <a:solidFill>
-                  <a:prstClr val="black"/>
-                </a:solidFill>
-                <a:latin typeface="Arial" panose="020B0604020202020204" pitchFamily="34" charset="0"/>
-                <a:cs typeface="Arial" panose="020B0604020202020204" pitchFamily="34" charset="0"/>
-              </a:endParaRPr>
-            </a:p>
-          </p:txBody>
-        </p:sp>
-      </p:grpSp>
-      <p:grpSp>
-        <p:nvGrpSpPr>
-          <p:cNvPr id="329" name="Group 328">
-            <a:extLst>
-              <a:ext uri="{FF2B5EF4-FFF2-40B4-BE49-F238E27FC236}">
-                <a16:creationId xmlns:a16="http://schemas.microsoft.com/office/drawing/2014/main" id="{15C90D8A-248E-462D-A424-104F88AB72F0}"/>
-              </a:ext>
-            </a:extLst>
-          </p:cNvPr>
-          <p:cNvGrpSpPr/>
-          <p:nvPr/>
-        </p:nvGrpSpPr>
-        <p:grpSpPr>
-          <a:xfrm>
-            <a:off x="5521168" y="3162432"/>
-            <a:ext cx="983014" cy="386923"/>
-            <a:chOff x="5567613" y="2920874"/>
-            <a:chExt cx="983014" cy="386923"/>
-          </a:xfrm>
-        </p:grpSpPr>
-        <p:sp>
-          <p:nvSpPr>
-            <p:cNvPr id="308" name="Cube 307">
+                </a:endParaRPr>
+              </a:p>
+            </p:txBody>
+          </p:sp>
+        </p:grpSp>
+        <p:cxnSp>
+          <p:nvCxnSpPr>
+            <p:cNvPr id="12" name="Straight Arrow Connector 11">
               <a:extLst>
                 <a:ext uri="{FF2B5EF4-FFF2-40B4-BE49-F238E27FC236}">
-                  <a16:creationId xmlns:a16="http://schemas.microsoft.com/office/drawing/2014/main" id="{3C2E4CC1-C76D-4122-9D4D-CAE4E7CA48A1}"/>
+                  <a16:creationId xmlns:a16="http://schemas.microsoft.com/office/drawing/2014/main" id="{0C44B696-58D5-4935-91C7-65C20B28E004}"/>
                 </a:ext>
               </a:extLst>
             </p:cNvPr>
-            <p:cNvSpPr/>
+            <p:cNvCxnSpPr/>
             <p:nvPr/>
-          </p:nvSpPr>
+          </p:nvCxnSpPr>
           <p:spPr>
             <a:xfrm>
-              <a:off x="5664437" y="2920874"/>
-              <a:ext cx="789366" cy="144285"/>
+              <a:off x="4785567" y="2340007"/>
+              <a:ext cx="0" cy="667518"/>
             </a:xfrm>
-            <a:prstGeom prst="cube">
+            <a:prstGeom prst="straightConnector1">
               <a:avLst/>
             </a:prstGeom>
-            <a:solidFill>
-              <a:srgbClr val="92D050"/>
-            </a:solidFill>
-            <a:ln/>
+            <a:ln>
+              <a:solidFill>
+                <a:schemeClr val="tx1"/>
+              </a:solidFill>
+              <a:headEnd type="triangle" w="sm" len="sm"/>
+              <a:tailEnd type="triangle" w="sm" len="sm"/>
+            </a:ln>
           </p:spPr>
           <p:style>
-            <a:lnRef idx="2">
-              <a:schemeClr val="dk1"/>
+            <a:lnRef idx="1">
+              <a:schemeClr val="accent1"/>
             </a:lnRef>
-            <a:fillRef idx="1">
-              <a:schemeClr val="lt1"/>
+            <a:fillRef idx="0">
+              <a:schemeClr val="accent1"/>
             </a:fillRef>
             <a:effectRef idx="0">
-              <a:schemeClr val="dk1"/>
+              <a:schemeClr val="accent1"/>
             </a:effectRef>
             <a:fontRef idx="minor">
-              <a:schemeClr val="dk1"/>
+              <a:schemeClr val="tx1"/>
             </a:fontRef>
           </p:style>
-          <p:txBody>
-            <a:bodyPr rtlCol="0" anchor="ctr"/>
-            <a:lstStyle/>
-            <a:p>
-              <a:pPr algn="ctr"/>
-              <a:endParaRPr lang="en-US"/>
-            </a:p>
-          </p:txBody>
-        </p:sp>
-        <p:sp>
-          <p:nvSpPr>
-            <p:cNvPr id="328" name="Rectangle 327">
+        </p:cxnSp>
+        <p:cxnSp>
+          <p:nvCxnSpPr>
+            <p:cNvPr id="180" name="Straight Arrow Connector 179">
               <a:extLst>
                 <a:ext uri="{FF2B5EF4-FFF2-40B4-BE49-F238E27FC236}">
-                  <a16:creationId xmlns:a16="http://schemas.microsoft.com/office/drawing/2014/main" id="{C44CC823-6D55-41AC-9103-EFC34FAE50C1}"/>
+                  <a16:creationId xmlns:a16="http://schemas.microsoft.com/office/drawing/2014/main" id="{0CF48F93-D177-48D4-9A9A-1F636860A8FE}"/>
                 </a:ext>
               </a:extLst>
             </p:cNvPr>
-            <p:cNvSpPr/>
+            <p:cNvCxnSpPr>
+              <a:cxnSpLocks/>
+            </p:cNvCxnSpPr>
             <p:nvPr/>
-          </p:nvSpPr>
+          </p:nvCxnSpPr>
           <p:spPr>
             <a:xfrm>
-              <a:off x="5567613" y="3053881"/>
-              <a:ext cx="983014" cy="253916"/>
+              <a:off x="5403273" y="2669129"/>
+              <a:ext cx="509508" cy="0"/>
             </a:xfrm>
-            <a:prstGeom prst="rect">
+            <a:prstGeom prst="straightConnector1">
               <a:avLst/>
             </a:prstGeom>
+            <a:ln w="6350">
+              <a:solidFill>
+                <a:schemeClr val="tx1"/>
+              </a:solidFill>
+              <a:tailEnd type="triangle" w="sm" len="sm"/>
+            </a:ln>
           </p:spPr>
-          <p:txBody>
-            <a:bodyPr wrap="square">
-              <a:spAutoFit/>
-            </a:bodyPr>
-            <a:lstStyle/>
-            <a:p>
-              <a:pPr lvl="0" algn="ctr"/>
-              <a:r>
-                <a:rPr lang="en-US" sz="1050" i="1" dirty="0" err="1">
-                  <a:solidFill>
-                    <a:prstClr val="black"/>
-                  </a:solidFill>
-                  <a:latin typeface="Arial" panose="020B0604020202020204" pitchFamily="34" charset="0"/>
-                  <a:cs typeface="Arial" panose="020B0604020202020204" pitchFamily="34" charset="0"/>
-                </a:rPr>
-                <a:t>FusionFC</a:t>
-              </a:r>
-              <a:endParaRPr lang="en-US" sz="1050" i="1" dirty="0">
-                <a:solidFill>
-                  <a:prstClr val="black"/>
-                </a:solidFill>
-                <a:latin typeface="Arial" panose="020B0604020202020204" pitchFamily="34" charset="0"/>
-                <a:cs typeface="Arial" panose="020B0604020202020204" pitchFamily="34" charset="0"/>
-              </a:endParaRPr>
-            </a:p>
-          </p:txBody>
-        </p:sp>
-      </p:grpSp>
-      <p:grpSp>
-        <p:nvGrpSpPr>
-          <p:cNvPr id="337" name="Group 336">
-            <a:extLst>
-              <a:ext uri="{FF2B5EF4-FFF2-40B4-BE49-F238E27FC236}">
-                <a16:creationId xmlns:a16="http://schemas.microsoft.com/office/drawing/2014/main" id="{BB1603FD-0CDB-4CAB-BAC7-01838C518A35}"/>
-              </a:ext>
-            </a:extLst>
-          </p:cNvPr>
-          <p:cNvGrpSpPr/>
-          <p:nvPr/>
-        </p:nvGrpSpPr>
-        <p:grpSpPr>
-          <a:xfrm>
-            <a:off x="6665363" y="2787234"/>
-            <a:ext cx="983014" cy="438395"/>
-            <a:chOff x="2406800" y="4049300"/>
-            <a:chExt cx="983014" cy="438395"/>
-          </a:xfrm>
-        </p:grpSpPr>
-        <p:sp>
-          <p:nvSpPr>
-            <p:cNvPr id="338" name="Cube 337">
+          <p:style>
+            <a:lnRef idx="1">
+              <a:schemeClr val="accent1"/>
+            </a:lnRef>
+            <a:fillRef idx="0">
+              <a:schemeClr val="accent1"/>
+            </a:fillRef>
+            <a:effectRef idx="0">
+              <a:schemeClr val="accent1"/>
+            </a:effectRef>
+            <a:fontRef idx="minor">
+              <a:schemeClr val="tx1"/>
+            </a:fontRef>
+          </p:style>
+        </p:cxnSp>
+        <p:cxnSp>
+          <p:nvCxnSpPr>
+            <p:cNvPr id="27" name="Connector: Elbow 26">
               <a:extLst>
                 <a:ext uri="{FF2B5EF4-FFF2-40B4-BE49-F238E27FC236}">
-                  <a16:creationId xmlns:a16="http://schemas.microsoft.com/office/drawing/2014/main" id="{08F536EA-81B5-4C3E-AF7D-C428CA013231}"/>
+                  <a16:creationId xmlns:a16="http://schemas.microsoft.com/office/drawing/2014/main" id="{107A5C54-222D-43E1-B9AB-6C3954E50CFC}"/>
                 </a:ext>
               </a:extLst>
             </p:cNvPr>
-            <p:cNvSpPr/>
+            <p:cNvCxnSpPr>
+              <a:stCxn id="308" idx="5"/>
+              <a:endCxn id="338" idx="2"/>
+            </p:cNvCxnSpPr>
             <p:nvPr/>
-          </p:nvSpPr>
+          </p:nvCxnSpPr>
           <p:spPr>
-            <a:xfrm>
-              <a:off x="2494517" y="4049300"/>
-              <a:ext cx="789366" cy="144285"/>
+            <a:xfrm flipV="1">
+              <a:off x="6407358" y="2877412"/>
+              <a:ext cx="345722" cy="339127"/>
             </a:xfrm>
-            <a:prstGeom prst="cube">
+            <a:prstGeom prst="bentConnector3">
               <a:avLst/>
             </a:prstGeom>
-            <a:solidFill>
-              <a:srgbClr val="FF0000"/>
-            </a:solidFill>
-            <a:ln/>
+            <a:ln>
+              <a:solidFill>
+                <a:schemeClr val="tx1"/>
+              </a:solidFill>
+              <a:tailEnd type="triangle" w="sm" len="sm"/>
+            </a:ln>
           </p:spPr>
           <p:style>
-            <a:lnRef idx="2">
-              <a:schemeClr val="dk1"/>
+            <a:lnRef idx="1">
+              <a:schemeClr val="accent1"/>
             </a:lnRef>
-            <a:fillRef idx="1">
-              <a:schemeClr val="lt1"/>
+            <a:fillRef idx="0">
+              <a:schemeClr val="accent1"/>
             </a:fillRef>
             <a:effectRef idx="0">
-              <a:schemeClr val="dk1"/>
+              <a:schemeClr val="accent1"/>
             </a:effectRef>
             <a:fontRef idx="minor">
-              <a:schemeClr val="dk1"/>
+              <a:schemeClr val="tx1"/>
             </a:fontRef>
           </p:style>
-          <p:txBody>
-            <a:bodyPr rtlCol="0" anchor="ctr"/>
-            <a:lstStyle/>
-            <a:p>
-              <a:pPr algn="ctr"/>
-              <a:endParaRPr lang="en-US"/>
-            </a:p>
-          </p:txBody>
-        </p:sp>
-        <p:sp>
-          <p:nvSpPr>
-            <p:cNvPr id="339" name="Rectangle 338">
+        </p:cxnSp>
+        <p:cxnSp>
+          <p:nvCxnSpPr>
+            <p:cNvPr id="29" name="Connector: Elbow 28">
               <a:extLst>
                 <a:ext uri="{FF2B5EF4-FFF2-40B4-BE49-F238E27FC236}">
-                  <a16:creationId xmlns:a16="http://schemas.microsoft.com/office/drawing/2014/main" id="{55FCD7A3-B6BE-4B92-9EB3-051F8A2B89BA}"/>
+                  <a16:creationId xmlns:a16="http://schemas.microsoft.com/office/drawing/2014/main" id="{40CA8ED3-4BF5-4BBB-9BC8-DCF9D5BB448B}"/>
                 </a:ext>
               </a:extLst>
             </p:cNvPr>
-            <p:cNvSpPr/>
+            <p:cNvCxnSpPr>
+              <a:stCxn id="308" idx="5"/>
+              <a:endCxn id="174" idx="2"/>
+            </p:cNvCxnSpPr>
             <p:nvPr/>
-          </p:nvSpPr>
+          </p:nvCxnSpPr>
           <p:spPr>
             <a:xfrm>
-              <a:off x="2406800" y="4233779"/>
-              <a:ext cx="983014" cy="253916"/>
+              <a:off x="6407358" y="3216539"/>
+              <a:ext cx="342178" cy="262812"/>
             </a:xfrm>
-            <a:prstGeom prst="rect">
+            <a:prstGeom prst="bentConnector3">
               <a:avLst/>
             </a:prstGeom>
+            <a:ln>
+              <a:solidFill>
+                <a:schemeClr val="tx1"/>
+              </a:solidFill>
+              <a:tailEnd type="triangle" w="sm" len="sm"/>
+            </a:ln>
           </p:spPr>
-          <p:txBody>
-            <a:bodyPr wrap="square">
-              <a:spAutoFit/>
-            </a:bodyPr>
-            <a:lstStyle/>
-            <a:p>
-              <a:pPr lvl="0" algn="ctr"/>
-              <a:r>
-                <a:rPr lang="en-US" sz="1050" i="1" dirty="0" err="1">
-                  <a:solidFill>
-                    <a:prstClr val="black"/>
-                  </a:solidFill>
-                  <a:latin typeface="Arial" panose="020B0604020202020204" pitchFamily="34" charset="0"/>
-                  <a:cs typeface="Arial" panose="020B0604020202020204" pitchFamily="34" charset="0"/>
-                </a:rPr>
-                <a:t>PDecFC</a:t>
-              </a:r>
-              <a:endParaRPr lang="en-US" sz="1050" i="1" dirty="0">
-                <a:solidFill>
-                  <a:prstClr val="black"/>
-                </a:solidFill>
-                <a:latin typeface="Arial" panose="020B0604020202020204" pitchFamily="34" charset="0"/>
-                <a:cs typeface="Arial" panose="020B0604020202020204" pitchFamily="34" charset="0"/>
-              </a:endParaRPr>
-            </a:p>
-          </p:txBody>
-        </p:sp>
-      </p:grpSp>
-      <mc:AlternateContent xmlns:mc="http://schemas.openxmlformats.org/markup-compatibility/2006">
-        <mc:Choice xmlns:a14="http://schemas.microsoft.com/office/drawing/2010/main" Requires="a14">
-          <p:sp>
-            <p:nvSpPr>
-              <p:cNvPr id="398" name="TextBox 397">
-                <a:extLst>
-                  <a:ext uri="{FF2B5EF4-FFF2-40B4-BE49-F238E27FC236}">
-                    <a16:creationId xmlns:a16="http://schemas.microsoft.com/office/drawing/2014/main" id="{6162F011-46BD-4B84-A32D-209235B4154E}"/>
-                  </a:ext>
-                </a:extLst>
-              </p:cNvPr>
-              <p:cNvSpPr txBox="1"/>
-              <p:nvPr/>
-            </p:nvSpPr>
-            <p:spPr>
-              <a:xfrm>
-                <a:off x="7815717" y="1787581"/>
-                <a:ext cx="829651" cy="253916"/>
-              </a:xfrm>
-              <a:prstGeom prst="rect">
-                <a:avLst/>
-              </a:prstGeom>
-              <a:noFill/>
-            </p:spPr>
-            <p:txBody>
-              <a:bodyPr wrap="none" rtlCol="0">
-                <a:spAutoFit/>
-              </a:bodyPr>
-              <a:lstStyle/>
-              <a:p>
-                <a:pPr/>
-                <a14:m>
-                  <m:oMathPara xmlns:m="http://schemas.openxmlformats.org/officeDocument/2006/math">
-                    <m:oMathParaPr>
-                      <m:jc m:val="centerGroup"/>
-                    </m:oMathParaPr>
-                    <m:oMath xmlns:m="http://schemas.openxmlformats.org/officeDocument/2006/math">
-                      <m:r>
-                        <a:rPr lang="en-US" sz="1050" b="1" i="1" smtClean="0">
-                          <a:latin typeface="Cambria Math" panose="02040503050406030204" pitchFamily="18" charset="0"/>
-                        </a:rPr>
-                        <m:t>𝑶</m:t>
-                      </m:r>
-                      <m:r>
-                        <a:rPr lang="en-US" sz="1050" b="1" i="1" smtClean="0">
-                          <a:latin typeface="Cambria Math" panose="02040503050406030204" pitchFamily="18" charset="0"/>
-                        </a:rPr>
-                        <m:t>(</m:t>
-                      </m:r>
-                      <m:r>
-                        <a:rPr lang="en-US" sz="1050" b="1" i="1" smtClean="0">
-                          <a:latin typeface="Cambria Math" panose="02040503050406030204" pitchFamily="18" charset="0"/>
-                        </a:rPr>
-                        <m:t>𝒕</m:t>
-                      </m:r>
-                      <m:r>
-                        <a:rPr lang="en-US" sz="1050" b="1" i="1" smtClean="0">
-                          <a:latin typeface="Cambria Math" panose="02040503050406030204" pitchFamily="18" charset="0"/>
-                        </a:rPr>
-                        <m:t>, </m:t>
-                      </m:r>
-                      <m:r>
-                        <a:rPr lang="en-US" sz="1050" b="1" i="1" smtClean="0">
-                          <a:latin typeface="Cambria Math" panose="02040503050406030204" pitchFamily="18" charset="0"/>
-                        </a:rPr>
-                        <m:t>𝒕</m:t>
-                      </m:r>
-                      <m:r>
-                        <a:rPr lang="en-US" sz="1050" b="1" i="1" smtClean="0">
-                          <a:latin typeface="Cambria Math" panose="02040503050406030204" pitchFamily="18" charset="0"/>
-                        </a:rPr>
-                        <m:t>+</m:t>
-                      </m:r>
-                      <m:r>
-                        <a:rPr lang="en-US" sz="1050" b="1" i="1" smtClean="0">
-                          <a:latin typeface="Cambria Math" panose="02040503050406030204" pitchFamily="18" charset="0"/>
-                        </a:rPr>
-                        <m:t>𝟏</m:t>
-                      </m:r>
-                      <m:r>
-                        <a:rPr lang="en-US" sz="1050" b="1" i="0" smtClean="0">
-                          <a:latin typeface="Cambria Math" panose="02040503050406030204" pitchFamily="18" charset="0"/>
-                        </a:rPr>
-                        <m:t>)</m:t>
-                      </m:r>
-                    </m:oMath>
-                  </m:oMathPara>
-                </a14:m>
-                <a:endParaRPr lang="en-US" sz="1050" b="1" dirty="0"/>
-              </a:p>
-            </p:txBody>
-          </p:sp>
-        </mc:Choice>
-        <mc:Fallback>
-          <p:sp>
-            <p:nvSpPr>
-              <p:cNvPr id="398" name="TextBox 397">
-                <a:extLst>
-                  <a:ext uri="{FF2B5EF4-FFF2-40B4-BE49-F238E27FC236}">
-                    <a16:creationId xmlns:a16="http://schemas.microsoft.com/office/drawing/2014/main" id="{6162F011-46BD-4B84-A32D-209235B4154E}"/>
-                  </a:ext>
-                </a:extLst>
-              </p:cNvPr>
-              <p:cNvSpPr txBox="1">
-                <a:spLocks noRot="1" noChangeAspect="1" noMove="1" noResize="1" noEditPoints="1" noAdjustHandles="1" noChangeArrowheads="1" noChangeShapeType="1" noTextEdit="1"/>
-              </p:cNvSpPr>
-              <p:nvPr/>
-            </p:nvSpPr>
-            <p:spPr>
-              <a:xfrm>
-                <a:off x="7815717" y="1787581"/>
-                <a:ext cx="829651" cy="253916"/>
-              </a:xfrm>
-              <a:prstGeom prst="rect">
-                <a:avLst/>
-              </a:prstGeom>
-              <a:blipFill>
-                <a:blip r:embed="rId2"/>
-                <a:stretch>
-                  <a:fillRect b="-7143"/>
-                </a:stretch>
-              </a:blipFill>
-            </p:spPr>
-            <p:txBody>
-              <a:bodyPr/>
-              <a:lstStyle/>
-              <a:p>
-                <a:r>
-                  <a:rPr lang="en-US">
-                    <a:noFill/>
-                  </a:rPr>
-                  <a:t> </a:t>
-                </a:r>
-              </a:p>
-            </p:txBody>
-          </p:sp>
-        </mc:Fallback>
-      </mc:AlternateContent>
-      <mc:AlternateContent xmlns:mc="http://schemas.openxmlformats.org/markup-compatibility/2006">
-        <mc:Choice xmlns:a14="http://schemas.microsoft.com/office/drawing/2010/main" Requires="a14">
-          <p:sp>
-            <p:nvSpPr>
-              <p:cNvPr id="399" name="TextBox 398">
-                <a:extLst>
-                  <a:ext uri="{FF2B5EF4-FFF2-40B4-BE49-F238E27FC236}">
-                    <a16:creationId xmlns:a16="http://schemas.microsoft.com/office/drawing/2014/main" id="{BC3866E9-6561-4E64-9C02-B38EDEC67EA1}"/>
-                  </a:ext>
-                </a:extLst>
-              </p:cNvPr>
-              <p:cNvSpPr txBox="1"/>
-              <p:nvPr/>
-            </p:nvSpPr>
-            <p:spPr>
-              <a:xfrm>
-                <a:off x="3226732" y="3161550"/>
-                <a:ext cx="709425" cy="253916"/>
-              </a:xfrm>
-              <a:prstGeom prst="rect">
-                <a:avLst/>
-              </a:prstGeom>
-              <a:noFill/>
-            </p:spPr>
-            <p:txBody>
-              <a:bodyPr wrap="none" rtlCol="0">
-                <a:spAutoFit/>
-              </a:bodyPr>
-              <a:lstStyle/>
-              <a:p>
-                <a:pPr/>
-                <a14:m>
-                  <m:oMathPara xmlns:m="http://schemas.openxmlformats.org/officeDocument/2006/math">
-                    <m:oMathParaPr>
-                      <m:jc m:val="centerGroup"/>
-                    </m:oMathParaPr>
-                    <m:oMath xmlns:m="http://schemas.openxmlformats.org/officeDocument/2006/math">
-                      <m:r>
-                        <a:rPr lang="en-US" sz="1050" b="1" i="1" smtClean="0">
-                          <a:latin typeface="Cambria Math" panose="02040503050406030204" pitchFamily="18" charset="0"/>
-                        </a:rPr>
-                        <m:t>𝒉</m:t>
-                      </m:r>
-                      <m:r>
-                        <a:rPr lang="en-US" sz="1050" b="1" i="1" smtClean="0">
-                          <a:latin typeface="Cambria Math" panose="02040503050406030204" pitchFamily="18" charset="0"/>
-                        </a:rPr>
-                        <m:t>(</m:t>
-                      </m:r>
-                      <m:r>
-                        <a:rPr lang="en-US" sz="1050" b="1" i="1" smtClean="0">
-                          <a:latin typeface="Cambria Math" panose="02040503050406030204" pitchFamily="18" charset="0"/>
-                        </a:rPr>
-                        <m:t>𝒕</m:t>
-                      </m:r>
-                      <m:r>
-                        <a:rPr lang="en-US" sz="1050" b="1" i="1" smtClean="0">
-                          <a:latin typeface="Cambria Math" panose="02040503050406030204" pitchFamily="18" charset="0"/>
-                        </a:rPr>
-                        <m:t>−</m:t>
-                      </m:r>
-                      <m:r>
-                        <a:rPr lang="en-US" sz="1050" b="1" i="1" smtClean="0">
-                          <a:latin typeface="Cambria Math" panose="02040503050406030204" pitchFamily="18" charset="0"/>
-                        </a:rPr>
-                        <m:t>𝟏</m:t>
-                      </m:r>
-                      <m:r>
-                        <a:rPr lang="en-US" sz="1050" b="1" i="1" smtClean="0">
-                          <a:latin typeface="Cambria Math" panose="02040503050406030204" pitchFamily="18" charset="0"/>
-                        </a:rPr>
-                        <m:t>)</m:t>
-                      </m:r>
-                    </m:oMath>
-                  </m:oMathPara>
-                </a14:m>
-                <a:endParaRPr lang="en-US" sz="1050" b="1" dirty="0"/>
-              </a:p>
-            </p:txBody>
-          </p:sp>
-        </mc:Choice>
-        <mc:Fallback>
-          <p:sp>
-            <p:nvSpPr>
-              <p:cNvPr id="399" name="TextBox 398">
-                <a:extLst>
-                  <a:ext uri="{FF2B5EF4-FFF2-40B4-BE49-F238E27FC236}">
-                    <a16:creationId xmlns:a16="http://schemas.microsoft.com/office/drawing/2014/main" id="{BC3866E9-6561-4E64-9C02-B38EDEC67EA1}"/>
-                  </a:ext>
-                </a:extLst>
-              </p:cNvPr>
-              <p:cNvSpPr txBox="1">
-                <a:spLocks noRot="1" noChangeAspect="1" noMove="1" noResize="1" noEditPoints="1" noAdjustHandles="1" noChangeArrowheads="1" noChangeShapeType="1" noTextEdit="1"/>
-              </p:cNvSpPr>
-              <p:nvPr/>
-            </p:nvSpPr>
-            <p:spPr>
-              <a:xfrm>
-                <a:off x="3226732" y="3161550"/>
-                <a:ext cx="709425" cy="253916"/>
-              </a:xfrm>
-              <a:prstGeom prst="rect">
-                <a:avLst/>
-              </a:prstGeom>
-              <a:blipFill>
-                <a:blip r:embed="rId3"/>
-                <a:stretch>
-                  <a:fillRect b="-7317"/>
-                </a:stretch>
-              </a:blipFill>
-            </p:spPr>
-            <p:txBody>
-              <a:bodyPr/>
-              <a:lstStyle/>
-              <a:p>
-                <a:r>
-                  <a:rPr lang="en-US">
-                    <a:noFill/>
-                  </a:rPr>
-                  <a:t> </a:t>
-                </a:r>
-              </a:p>
-            </p:txBody>
-          </p:sp>
-        </mc:Fallback>
-      </mc:AlternateContent>
-      <mc:AlternateContent xmlns:mc="http://schemas.openxmlformats.org/markup-compatibility/2006">
-        <mc:Choice xmlns:a14="http://schemas.microsoft.com/office/drawing/2010/main" Requires="a14">
-          <p:sp>
-            <p:nvSpPr>
-              <p:cNvPr id="400" name="TextBox 399">
-                <a:extLst>
-                  <a:ext uri="{FF2B5EF4-FFF2-40B4-BE49-F238E27FC236}">
-                    <a16:creationId xmlns:a16="http://schemas.microsoft.com/office/drawing/2014/main" id="{C085BE11-4A2C-4BFC-A7AD-1F98EBBB5F54}"/>
-                  </a:ext>
-                </a:extLst>
-              </p:cNvPr>
-              <p:cNvSpPr txBox="1"/>
-              <p:nvPr/>
-            </p:nvSpPr>
-            <p:spPr>
-              <a:xfrm>
-                <a:off x="3225040" y="1837959"/>
-                <a:ext cx="699807" cy="253916"/>
-              </a:xfrm>
-              <a:prstGeom prst="rect">
-                <a:avLst/>
-              </a:prstGeom>
-              <a:noFill/>
-            </p:spPr>
-            <p:txBody>
-              <a:bodyPr wrap="none" rtlCol="0">
-                <a:spAutoFit/>
-              </a:bodyPr>
-              <a:lstStyle/>
-              <a:p>
-                <a:pPr/>
-                <a14:m>
-                  <m:oMathPara xmlns:m="http://schemas.openxmlformats.org/officeDocument/2006/math">
-                    <m:oMathParaPr>
-                      <m:jc m:val="centerGroup"/>
-                    </m:oMathParaPr>
-                    <m:oMath xmlns:m="http://schemas.openxmlformats.org/officeDocument/2006/math">
-                      <m:r>
-                        <a:rPr lang="en-US" sz="1050" b="1" i="1" smtClean="0">
-                          <a:latin typeface="Cambria Math" panose="02040503050406030204" pitchFamily="18" charset="0"/>
-                        </a:rPr>
-                        <m:t>𝒉</m:t>
-                      </m:r>
-                      <m:r>
-                        <a:rPr lang="en-US" sz="1050" b="1" i="1" smtClean="0">
-                          <a:latin typeface="Cambria Math" panose="02040503050406030204" pitchFamily="18" charset="0"/>
-                        </a:rPr>
-                        <m:t>(</m:t>
-                      </m:r>
-                      <m:r>
-                        <a:rPr lang="en-US" sz="1050" b="1" i="1" smtClean="0">
-                          <a:latin typeface="Cambria Math" panose="02040503050406030204" pitchFamily="18" charset="0"/>
-                        </a:rPr>
-                        <m:t>𝒕</m:t>
-                      </m:r>
-                      <m:r>
-                        <a:rPr lang="en-US" sz="1050" b="1" i="1" smtClean="0">
-                          <a:latin typeface="Cambria Math" panose="02040503050406030204" pitchFamily="18" charset="0"/>
-                        </a:rPr>
-                        <m:t>−ℓ)</m:t>
-                      </m:r>
-                    </m:oMath>
-                  </m:oMathPara>
-                </a14:m>
-                <a:endParaRPr lang="en-US" sz="1050" b="1" dirty="0"/>
-              </a:p>
-            </p:txBody>
-          </p:sp>
-        </mc:Choice>
-        <mc:Fallback>
-          <p:sp>
-            <p:nvSpPr>
-              <p:cNvPr id="400" name="TextBox 399">
-                <a:extLst>
-                  <a:ext uri="{FF2B5EF4-FFF2-40B4-BE49-F238E27FC236}">
-                    <a16:creationId xmlns:a16="http://schemas.microsoft.com/office/drawing/2014/main" id="{C085BE11-4A2C-4BFC-A7AD-1F98EBBB5F54}"/>
-                  </a:ext>
-                </a:extLst>
-              </p:cNvPr>
-              <p:cNvSpPr txBox="1">
-                <a:spLocks noRot="1" noChangeAspect="1" noMove="1" noResize="1" noEditPoints="1" noAdjustHandles="1" noChangeArrowheads="1" noChangeShapeType="1" noTextEdit="1"/>
-              </p:cNvSpPr>
-              <p:nvPr/>
-            </p:nvSpPr>
-            <p:spPr>
-              <a:xfrm>
-                <a:off x="3225040" y="1837959"/>
-                <a:ext cx="699807" cy="253916"/>
-              </a:xfrm>
-              <a:prstGeom prst="rect">
-                <a:avLst/>
-              </a:prstGeom>
-              <a:blipFill>
-                <a:blip r:embed="rId4"/>
-                <a:stretch>
-                  <a:fillRect b="-7317"/>
-                </a:stretch>
-              </a:blipFill>
-            </p:spPr>
-            <p:txBody>
-              <a:bodyPr/>
-              <a:lstStyle/>
-              <a:p>
-                <a:r>
-                  <a:rPr lang="en-US">
-                    <a:noFill/>
-                  </a:rPr>
-                  <a:t> </a:t>
-                </a:r>
-              </a:p>
-            </p:txBody>
-          </p:sp>
-        </mc:Fallback>
-      </mc:AlternateContent>
-      <p:sp>
-        <p:nvSpPr>
-          <p:cNvPr id="316" name="Oval 315">
-            <a:extLst>
-              <a:ext uri="{FF2B5EF4-FFF2-40B4-BE49-F238E27FC236}">
-                <a16:creationId xmlns:a16="http://schemas.microsoft.com/office/drawing/2014/main" id="{50A9C40C-48F3-4808-BA31-13745677202B}"/>
-              </a:ext>
-            </a:extLst>
-          </p:cNvPr>
-          <p:cNvSpPr/>
-          <p:nvPr/>
-        </p:nvSpPr>
-        <p:spPr>
-          <a:xfrm>
-            <a:off x="5903533" y="2578775"/>
-            <a:ext cx="254356" cy="194756"/>
-          </a:xfrm>
-          <a:prstGeom prst="ellipse">
-            <a:avLst/>
-          </a:prstGeom>
-          <a:solidFill>
-            <a:schemeClr val="bg1">
-              <a:lumMod val="85000"/>
-            </a:schemeClr>
-          </a:solidFill>
-          <a:ln w="6350">
-            <a:solidFill>
+          <p:style>
+            <a:lnRef idx="1">
+              <a:schemeClr val="accent1"/>
+            </a:lnRef>
+            <a:fillRef idx="0">
+              <a:schemeClr val="accent1"/>
+            </a:fillRef>
+            <a:effectRef idx="0">
+              <a:schemeClr val="accent1"/>
+            </a:effectRef>
+            <a:fontRef idx="minor">
               <a:schemeClr val="tx1"/>
-            </a:solidFill>
-          </a:ln>
-        </p:spPr>
-        <p:style>
-          <a:lnRef idx="2">
-            <a:schemeClr val="accent1">
-              <a:shade val="50000"/>
-            </a:schemeClr>
-          </a:lnRef>
-          <a:fillRef idx="1">
-            <a:schemeClr val="accent1"/>
-          </a:fillRef>
-          <a:effectRef idx="0">
-            <a:schemeClr val="accent1"/>
-          </a:effectRef>
-          <a:fontRef idx="minor">
-            <a:schemeClr val="lt1"/>
-          </a:fontRef>
-        </p:style>
-        <p:txBody>
-          <a:bodyPr lIns="0" tIns="0" rIns="0" bIns="0" rtlCol="0" anchor="ctr">
-            <a:spAutoFit/>
-          </a:bodyPr>
-          <a:lstStyle/>
-          <a:p>
-            <a:pPr algn="ctr"/>
-            <a:r>
-              <a:rPr lang="en-US" sz="900" dirty="0">
-                <a:ln w="0"/>
-                <a:solidFill>
-                  <a:schemeClr val="tx1"/>
-                </a:solidFill>
-                <a:effectLst>
-                  <a:outerShdw blurRad="38100" dist="19050" dir="2700000" algn="tl" rotWithShape="0">
-                    <a:schemeClr val="dk1">
-                      <a:alpha val="40000"/>
-                    </a:schemeClr>
-                  </a:outerShdw>
-                </a:effectLst>
-              </a:rPr>
-              <a:t>+</a:t>
-            </a:r>
-          </a:p>
-        </p:txBody>
-      </p:sp>
-      <p:cxnSp>
-        <p:nvCxnSpPr>
-          <p:cNvPr id="10" name="Connector: Elbow 9">
-            <a:extLst>
-              <a:ext uri="{FF2B5EF4-FFF2-40B4-BE49-F238E27FC236}">
-                <a16:creationId xmlns:a16="http://schemas.microsoft.com/office/drawing/2014/main" id="{D59BFA37-6E21-4ACA-ABA9-65A4A83E04AC}"/>
-              </a:ext>
-            </a:extLst>
-          </p:cNvPr>
-          <p:cNvCxnSpPr>
-            <a:cxnSpLocks/>
-            <a:stCxn id="234" idx="5"/>
-            <a:endCxn id="263" idx="5"/>
-          </p:cNvCxnSpPr>
-          <p:nvPr/>
-        </p:nvCxnSpPr>
-        <p:spPr>
-          <a:xfrm>
-            <a:off x="5177074" y="1936488"/>
-            <a:ext cx="3176" cy="1289141"/>
-          </a:xfrm>
-          <a:prstGeom prst="bentConnector3">
-            <a:avLst>
-              <a:gd name="adj1" fmla="val 7297733"/>
-            </a:avLst>
-          </a:prstGeom>
-        </p:spPr>
-        <p:style>
-          <a:lnRef idx="1">
-            <a:schemeClr val="dk1"/>
-          </a:lnRef>
-          <a:fillRef idx="0">
-            <a:schemeClr val="dk1"/>
-          </a:fillRef>
-          <a:effectRef idx="0">
-            <a:schemeClr val="dk1"/>
-          </a:effectRef>
-          <a:fontRef idx="minor">
-            <a:schemeClr val="tx1"/>
-          </a:fontRef>
-        </p:style>
-      </p:cxnSp>
-      <mc:AlternateContent xmlns:mc="http://schemas.openxmlformats.org/markup-compatibility/2006">
-        <mc:Choice xmlns:a14="http://schemas.microsoft.com/office/drawing/2010/main" Requires="a14">
-          <p:sp>
-            <p:nvSpPr>
-              <p:cNvPr id="172" name="TextBox 171">
-                <a:extLst>
-                  <a:ext uri="{FF2B5EF4-FFF2-40B4-BE49-F238E27FC236}">
-                    <a16:creationId xmlns:a16="http://schemas.microsoft.com/office/drawing/2014/main" id="{E907155D-B1F3-4FB2-A4D3-FC66D417D516}"/>
-                  </a:ext>
-                </a:extLst>
-              </p:cNvPr>
-              <p:cNvSpPr txBox="1"/>
-              <p:nvPr/>
-            </p:nvSpPr>
-            <p:spPr>
-              <a:xfrm>
-                <a:off x="7784256" y="3138049"/>
-                <a:ext cx="775918" cy="597279"/>
-              </a:xfrm>
-              <a:prstGeom prst="rect">
-                <a:avLst/>
-              </a:prstGeom>
-              <a:noFill/>
-            </p:spPr>
-            <p:txBody>
-              <a:bodyPr wrap="none" rtlCol="0">
-                <a:spAutoFit/>
-              </a:bodyPr>
-              <a:lstStyle/>
-              <a:p>
-                <a:pPr/>
-                <a14:m>
-                  <m:oMathPara xmlns:m="http://schemas.openxmlformats.org/officeDocument/2006/math">
-                    <m:oMathParaPr>
-                      <m:jc m:val="centerGroup"/>
-                    </m:oMathParaPr>
-                    <m:oMath xmlns:m="http://schemas.openxmlformats.org/officeDocument/2006/math">
-                      <m:acc>
-                        <m:accPr>
-                          <m:chr m:val="̂"/>
-                          <m:ctrlPr>
-                            <a:rPr lang="en-US" sz="1050" b="1" i="1" smtClean="0">
-                              <a:latin typeface="Cambria Math" panose="02040503050406030204" pitchFamily="18" charset="0"/>
-                            </a:rPr>
-                          </m:ctrlPr>
-                        </m:accPr>
-                        <m:e>
-                          <m:sSub>
-                            <m:sSubPr>
-                              <m:ctrlPr>
-                                <a:rPr lang="en-US" sz="1050" b="1" i="1" smtClean="0">
-                                  <a:latin typeface="Cambria Math" panose="02040503050406030204" pitchFamily="18" charset="0"/>
-                                </a:rPr>
-                              </m:ctrlPr>
-                            </m:sSubPr>
-                            <m:e>
-                              <m:r>
-                                <a:rPr lang="en-US" sz="1050" b="1" i="1" smtClean="0">
-                                  <a:latin typeface="Cambria Math" panose="02040503050406030204" pitchFamily="18" charset="0"/>
-                                </a:rPr>
-                                <m:t>𝜽</m:t>
-                              </m:r>
-                            </m:e>
-                            <m:sub>
-                              <m:r>
-                                <a:rPr lang="en-US" sz="1050" b="1" i="1" smtClean="0">
-                                  <a:latin typeface="Cambria Math" panose="02040503050406030204" pitchFamily="18" charset="0"/>
-                                </a:rPr>
-                                <m:t>𝑯</m:t>
-                              </m:r>
-                            </m:sub>
-                          </m:sSub>
-                        </m:e>
-                      </m:acc>
-                      <m:r>
-                        <a:rPr lang="en-US" sz="1050" b="1" i="1" smtClean="0">
-                          <a:latin typeface="Cambria Math" panose="02040503050406030204" pitchFamily="18" charset="0"/>
-                        </a:rPr>
-                        <m:t>(</m:t>
-                      </m:r>
-                      <m:r>
-                        <a:rPr lang="en-US" sz="1050" b="1" i="1" smtClean="0">
-                          <a:latin typeface="Cambria Math" panose="02040503050406030204" pitchFamily="18" charset="0"/>
-                        </a:rPr>
-                        <m:t>𝒕</m:t>
-                      </m:r>
-                      <m:r>
-                        <a:rPr lang="en-US" sz="1050" b="1" i="0" smtClean="0">
-                          <a:latin typeface="Cambria Math" panose="02040503050406030204" pitchFamily="18" charset="0"/>
-                        </a:rPr>
-                        <m:t>)</m:t>
-                      </m:r>
-                    </m:oMath>
-                  </m:oMathPara>
-                </a14:m>
-                <a:endParaRPr lang="en-US" sz="1050" b="1" dirty="0"/>
-              </a:p>
-              <a:p>
-                <a:pPr/>
-                <a14:m>
-                  <m:oMathPara xmlns:m="http://schemas.openxmlformats.org/officeDocument/2006/math">
-                    <m:oMathParaPr>
-                      <m:jc m:val="centerGroup"/>
-                    </m:oMathParaPr>
-                    <m:oMath xmlns:m="http://schemas.openxmlformats.org/officeDocument/2006/math">
-                      <m:acc>
-                        <m:accPr>
-                          <m:chr m:val="̂"/>
-                          <m:ctrlPr>
-                            <a:rPr lang="en-US" sz="1050" b="1" i="1" smtClean="0">
-                              <a:latin typeface="Cambria Math" panose="02040503050406030204" pitchFamily="18" charset="0"/>
-                            </a:rPr>
-                          </m:ctrlPr>
-                        </m:accPr>
-                        <m:e>
-                          <m:sSub>
-                            <m:sSubPr>
-                              <m:ctrlPr>
-                                <a:rPr lang="en-US" sz="1050" b="1" i="1" smtClean="0">
-                                  <a:latin typeface="Cambria Math" panose="02040503050406030204" pitchFamily="18" charset="0"/>
-                                </a:rPr>
-                              </m:ctrlPr>
-                            </m:sSubPr>
-                            <m:e>
-                              <m:r>
-                                <a:rPr lang="en-US" sz="1050" b="1" i="1" smtClean="0">
-                                  <a:latin typeface="Cambria Math" panose="02040503050406030204" pitchFamily="18" charset="0"/>
-                                </a:rPr>
-                                <m:t>𝜽</m:t>
-                              </m:r>
-                            </m:e>
-                            <m:sub>
-                              <m:r>
-                                <a:rPr lang="en-US" sz="1050" b="1" i="1" smtClean="0">
-                                  <a:latin typeface="Cambria Math" panose="02040503050406030204" pitchFamily="18" charset="0"/>
-                                </a:rPr>
-                                <m:t>𝑭</m:t>
-                              </m:r>
-                            </m:sub>
-                          </m:sSub>
-                        </m:e>
-                      </m:acc>
-                      <m:r>
-                        <a:rPr lang="en-US" sz="1050" b="1" i="1">
-                          <a:latin typeface="Cambria Math" panose="02040503050406030204" pitchFamily="18" charset="0"/>
-                        </a:rPr>
-                        <m:t>(</m:t>
-                      </m:r>
-                      <m:r>
-                        <a:rPr lang="en-US" sz="1050" b="1" i="1">
-                          <a:latin typeface="Cambria Math" panose="02040503050406030204" pitchFamily="18" charset="0"/>
-                        </a:rPr>
-                        <m:t>𝒕</m:t>
-                      </m:r>
-                      <m:r>
-                        <a:rPr lang="en-US" sz="1050" b="1">
-                          <a:latin typeface="Cambria Math" panose="02040503050406030204" pitchFamily="18" charset="0"/>
-                        </a:rPr>
-                        <m:t>)</m:t>
-                      </m:r>
-                    </m:oMath>
-                  </m:oMathPara>
-                </a14:m>
-                <a:endParaRPr lang="en-US" sz="1050" b="1" dirty="0"/>
-              </a:p>
-              <a:p>
-                <a:pPr/>
-                <a14:m>
-                  <m:oMathPara xmlns:m="http://schemas.openxmlformats.org/officeDocument/2006/math">
-                    <m:oMathParaPr>
-                      <m:jc m:val="centerGroup"/>
-                    </m:oMathParaPr>
-                    <m:oMath xmlns:m="http://schemas.openxmlformats.org/officeDocument/2006/math">
-                      <m:acc>
-                        <m:accPr>
-                          <m:chr m:val="̂"/>
-                          <m:ctrlPr>
-                            <a:rPr lang="en-US" sz="1050" b="1" i="1" smtClean="0">
-                              <a:latin typeface="Cambria Math" panose="02040503050406030204" pitchFamily="18" charset="0"/>
-                            </a:rPr>
-                          </m:ctrlPr>
-                        </m:accPr>
-                        <m:e>
-                          <m:sSub>
-                            <m:sSubPr>
-                              <m:ctrlPr>
-                                <a:rPr lang="en-US" sz="1050" b="1" i="1" smtClean="0">
-                                  <a:latin typeface="Cambria Math" panose="02040503050406030204" pitchFamily="18" charset="0"/>
-                                </a:rPr>
-                              </m:ctrlPr>
-                            </m:sSubPr>
-                            <m:e>
-                              <m:r>
-                                <a:rPr lang="en-US" sz="1050" b="1" i="1" smtClean="0">
-                                  <a:latin typeface="Cambria Math" panose="02040503050406030204" pitchFamily="18" charset="0"/>
-                                </a:rPr>
-                                <m:t>𝜽</m:t>
-                              </m:r>
-                            </m:e>
-                            <m:sub>
-                              <m:r>
-                                <a:rPr lang="en-US" sz="1050" b="1" i="1" smtClean="0">
-                                  <a:latin typeface="Cambria Math" panose="02040503050406030204" pitchFamily="18" charset="0"/>
-                                </a:rPr>
-                                <m:t>𝑭</m:t>
-                              </m:r>
-                            </m:sub>
-                          </m:sSub>
-                        </m:e>
-                      </m:acc>
-                      <m:r>
-                        <a:rPr lang="en-US" sz="1050" b="1" i="1">
-                          <a:latin typeface="Cambria Math" panose="02040503050406030204" pitchFamily="18" charset="0"/>
-                        </a:rPr>
-                        <m:t>(</m:t>
-                      </m:r>
-                      <m:r>
-                        <a:rPr lang="en-US" sz="1050" b="1" i="1">
-                          <a:latin typeface="Cambria Math" panose="02040503050406030204" pitchFamily="18" charset="0"/>
-                        </a:rPr>
-                        <m:t>𝒕</m:t>
-                      </m:r>
-                      <m:r>
-                        <a:rPr lang="en-US" sz="1050" b="1" i="1" smtClean="0">
-                          <a:latin typeface="Cambria Math" panose="02040503050406030204" pitchFamily="18" charset="0"/>
-                        </a:rPr>
-                        <m:t>+</m:t>
-                      </m:r>
-                      <m:r>
-                        <a:rPr lang="en-US" sz="1050" b="1" i="1" smtClean="0">
-                          <a:latin typeface="Cambria Math" panose="02040503050406030204" pitchFamily="18" charset="0"/>
-                        </a:rPr>
-                        <m:t>𝟏</m:t>
-                      </m:r>
-                      <m:r>
-                        <a:rPr lang="en-US" sz="1050" b="1">
-                          <a:latin typeface="Cambria Math" panose="02040503050406030204" pitchFamily="18" charset="0"/>
-                        </a:rPr>
-                        <m:t>)</m:t>
-                      </m:r>
-                    </m:oMath>
-                  </m:oMathPara>
-                </a14:m>
-                <a:endParaRPr lang="en-US" sz="1050" b="1" dirty="0"/>
-              </a:p>
-            </p:txBody>
-          </p:sp>
-        </mc:Choice>
-        <mc:Fallback>
-          <p:sp>
-            <p:nvSpPr>
-              <p:cNvPr id="172" name="TextBox 171">
-                <a:extLst>
-                  <a:ext uri="{FF2B5EF4-FFF2-40B4-BE49-F238E27FC236}">
-                    <a16:creationId xmlns:a16="http://schemas.microsoft.com/office/drawing/2014/main" id="{E907155D-B1F3-4FB2-A4D3-FC66D417D516}"/>
-                  </a:ext>
-                </a:extLst>
-              </p:cNvPr>
-              <p:cNvSpPr txBox="1">
-                <a:spLocks noRot="1" noChangeAspect="1" noMove="1" noResize="1" noEditPoints="1" noAdjustHandles="1" noChangeArrowheads="1" noChangeShapeType="1" noTextEdit="1"/>
-              </p:cNvSpPr>
-              <p:nvPr/>
-            </p:nvSpPr>
-            <p:spPr>
-              <a:xfrm>
-                <a:off x="7784256" y="3138049"/>
-                <a:ext cx="775918" cy="597279"/>
-              </a:xfrm>
-              <a:prstGeom prst="rect">
-                <a:avLst/>
-              </a:prstGeom>
-              <a:blipFill>
-                <a:blip r:embed="rId5"/>
-                <a:stretch>
-                  <a:fillRect r="-2362" b="-1020"/>
-                </a:stretch>
-              </a:blipFill>
-            </p:spPr>
-            <p:txBody>
-              <a:bodyPr/>
-              <a:lstStyle/>
-              <a:p>
-                <a:r>
-                  <a:rPr lang="en-US">
-                    <a:noFill/>
-                  </a:rPr>
-                  <a:t> </a:t>
-                </a:r>
-              </a:p>
-            </p:txBody>
-          </p:sp>
-        </mc:Fallback>
-      </mc:AlternateContent>
-      <p:cxnSp>
-        <p:nvCxnSpPr>
-          <p:cNvPr id="4" name="Straight Arrow Connector 3">
-            <a:extLst>
-              <a:ext uri="{FF2B5EF4-FFF2-40B4-BE49-F238E27FC236}">
-                <a16:creationId xmlns:a16="http://schemas.microsoft.com/office/drawing/2014/main" id="{2B5C7469-B725-4B1E-8AA2-5409897309A7}"/>
-              </a:ext>
-            </a:extLst>
-          </p:cNvPr>
-          <p:cNvCxnSpPr>
-            <a:stCxn id="400" idx="3"/>
-            <a:endCxn id="234" idx="2"/>
-          </p:cNvCxnSpPr>
-          <p:nvPr/>
-        </p:nvCxnSpPr>
-        <p:spPr>
-          <a:xfrm>
-            <a:off x="3924847" y="1964917"/>
-            <a:ext cx="430696" cy="7642"/>
-          </a:xfrm>
-          <a:prstGeom prst="straightConnector1">
-            <a:avLst/>
-          </a:prstGeom>
-          <a:ln w="6350">
-            <a:solidFill>
-              <a:schemeClr val="tx1"/>
-            </a:solidFill>
-            <a:tailEnd type="triangle" w="sm" len="sm"/>
-          </a:ln>
-        </p:spPr>
-        <p:style>
-          <a:lnRef idx="1">
-            <a:schemeClr val="accent1"/>
-          </a:lnRef>
-          <a:fillRef idx="0">
-            <a:schemeClr val="accent1"/>
-          </a:fillRef>
-          <a:effectRef idx="0">
-            <a:schemeClr val="accent1"/>
-          </a:effectRef>
-          <a:fontRef idx="minor">
-            <a:schemeClr val="tx1"/>
-          </a:fontRef>
-        </p:style>
-      </p:cxnSp>
-      <p:cxnSp>
-        <p:nvCxnSpPr>
-          <p:cNvPr id="161" name="Straight Arrow Connector 160">
-            <a:extLst>
-              <a:ext uri="{FF2B5EF4-FFF2-40B4-BE49-F238E27FC236}">
-                <a16:creationId xmlns:a16="http://schemas.microsoft.com/office/drawing/2014/main" id="{1C56799C-BC9A-4C95-9842-136A3C35ADDB}"/>
-              </a:ext>
-            </a:extLst>
-          </p:cNvPr>
-          <p:cNvCxnSpPr/>
-          <p:nvPr/>
-        </p:nvCxnSpPr>
-        <p:spPr>
-          <a:xfrm flipV="1">
-            <a:off x="3984731" y="3273772"/>
-            <a:ext cx="393453" cy="3900"/>
-          </a:xfrm>
-          <a:prstGeom prst="straightConnector1">
-            <a:avLst/>
-          </a:prstGeom>
-          <a:ln w="6350">
-            <a:solidFill>
-              <a:schemeClr val="tx1"/>
-            </a:solidFill>
-            <a:tailEnd type="triangle" w="sm" len="sm"/>
-          </a:ln>
-        </p:spPr>
-        <p:style>
-          <a:lnRef idx="1">
-            <a:schemeClr val="accent1"/>
-          </a:lnRef>
-          <a:fillRef idx="0">
-            <a:schemeClr val="accent1"/>
-          </a:fillRef>
-          <a:effectRef idx="0">
-            <a:schemeClr val="accent1"/>
-          </a:effectRef>
-          <a:fontRef idx="minor">
-            <a:schemeClr val="tx1"/>
-          </a:fontRef>
-        </p:style>
-      </p:cxnSp>
-      <p:grpSp>
-        <p:nvGrpSpPr>
-          <p:cNvPr id="162" name="Group 161">
-            <a:extLst>
-              <a:ext uri="{FF2B5EF4-FFF2-40B4-BE49-F238E27FC236}">
-                <a16:creationId xmlns:a16="http://schemas.microsoft.com/office/drawing/2014/main" id="{456544E6-20AD-44ED-9B7A-7831D3057B2D}"/>
-              </a:ext>
-            </a:extLst>
-          </p:cNvPr>
-          <p:cNvGrpSpPr/>
-          <p:nvPr/>
-        </p:nvGrpSpPr>
-        <p:grpSpPr>
-          <a:xfrm>
-            <a:off x="6665363" y="1865800"/>
-            <a:ext cx="983014" cy="438395"/>
-            <a:chOff x="2406800" y="4049300"/>
-            <a:chExt cx="983014" cy="438395"/>
-          </a:xfrm>
-        </p:grpSpPr>
-        <p:sp>
-          <p:nvSpPr>
-            <p:cNvPr id="163" name="Cube 162">
+            </a:fontRef>
+          </p:style>
+        </p:cxnSp>
+        <mc:AlternateContent xmlns:mc="http://schemas.openxmlformats.org/markup-compatibility/2006">
+          <mc:Choice xmlns:a14="http://schemas.microsoft.com/office/drawing/2010/main" Requires="a14">
+            <p:sp>
+              <p:nvSpPr>
+                <p:cNvPr id="187" name="TextBox 186">
+                  <a:extLst>
+                    <a:ext uri="{FF2B5EF4-FFF2-40B4-BE49-F238E27FC236}">
+                      <a16:creationId xmlns:a16="http://schemas.microsoft.com/office/drawing/2014/main" id="{B4077C72-0C7D-4634-8D5E-DA3BBF590F6D}"/>
+                    </a:ext>
+                  </a:extLst>
+                </p:cNvPr>
+                <p:cNvSpPr txBox="1"/>
+                <p:nvPr/>
+              </p:nvSpPr>
+              <p:spPr>
+                <a:xfrm>
+                  <a:off x="7784256" y="2710103"/>
+                  <a:ext cx="549317" cy="253916"/>
+                </a:xfrm>
+                <a:prstGeom prst="rect">
+                  <a:avLst/>
+                </a:prstGeom>
+                <a:noFill/>
+              </p:spPr>
+              <p:txBody>
+                <a:bodyPr wrap="none" rtlCol="0">
+                  <a:spAutoFit/>
+                </a:bodyPr>
+                <a:lstStyle/>
+                <a:p>
+                  <a:pPr/>
+                  <a14:m>
+                    <m:oMathPara xmlns:m="http://schemas.openxmlformats.org/officeDocument/2006/math">
+                      <m:oMathParaPr>
+                        <m:jc m:val="centerGroup"/>
+                      </m:oMathParaPr>
+                      <m:oMath xmlns:m="http://schemas.openxmlformats.org/officeDocument/2006/math">
+                        <m:sSub>
+                          <m:sSubPr>
+                            <m:ctrlPr>
+                              <a:rPr lang="en-US" sz="1050" b="1" i="1" smtClean="0">
+                                <a:latin typeface="Cambria Math" panose="02040503050406030204" pitchFamily="18" charset="0"/>
+                              </a:rPr>
+                            </m:ctrlPr>
+                          </m:sSubPr>
+                          <m:e>
+                            <m:acc>
+                              <m:accPr>
+                                <m:chr m:val="⃗"/>
+                                <m:ctrlPr>
+                                  <a:rPr lang="en-US" sz="1050" b="1" i="1" smtClean="0">
+                                    <a:latin typeface="Cambria Math" panose="02040503050406030204" pitchFamily="18" charset="0"/>
+                                  </a:rPr>
+                                </m:ctrlPr>
+                              </m:accPr>
+                              <m:e>
+                                <m:r>
+                                  <a:rPr lang="en-US" sz="1050" b="1" i="1" smtClean="0">
+                                    <a:latin typeface="Cambria Math" panose="02040503050406030204" pitchFamily="18" charset="0"/>
+                                  </a:rPr>
+                                  <m:t>𝒑</m:t>
+                                </m:r>
+                              </m:e>
+                            </m:acc>
+                          </m:e>
+                          <m:sub>
+                            <m:r>
+                              <a:rPr lang="en-US" sz="1050" b="1" i="1" smtClean="0">
+                                <a:latin typeface="Cambria Math" panose="02040503050406030204" pitchFamily="18" charset="0"/>
+                              </a:rPr>
+                              <m:t>𝑯</m:t>
+                            </m:r>
+                          </m:sub>
+                        </m:sSub>
+                        <m:r>
+                          <a:rPr lang="en-US" sz="1050" b="1" i="1" smtClean="0">
+                            <a:latin typeface="Cambria Math" panose="02040503050406030204" pitchFamily="18" charset="0"/>
+                          </a:rPr>
+                          <m:t>(</m:t>
+                        </m:r>
+                        <m:r>
+                          <a:rPr lang="en-US" sz="1050" b="1" i="1" smtClean="0">
+                            <a:latin typeface="Cambria Math" panose="02040503050406030204" pitchFamily="18" charset="0"/>
+                          </a:rPr>
+                          <m:t>𝒕</m:t>
+                        </m:r>
+                        <m:r>
+                          <a:rPr lang="en-US" sz="1050" b="1" i="1" smtClean="0">
+                            <a:latin typeface="Cambria Math" panose="02040503050406030204" pitchFamily="18" charset="0"/>
+                          </a:rPr>
+                          <m:t>)</m:t>
+                        </m:r>
+                      </m:oMath>
+                    </m:oMathPara>
+                  </a14:m>
+                  <a:endParaRPr lang="en-US" sz="1050" b="1" dirty="0"/>
+                </a:p>
+              </p:txBody>
+            </p:sp>
+          </mc:Choice>
+          <mc:Fallback>
+            <p:sp>
+              <p:nvSpPr>
+                <p:cNvPr id="187" name="TextBox 186">
+                  <a:extLst>
+                    <a:ext uri="{FF2B5EF4-FFF2-40B4-BE49-F238E27FC236}">
+                      <a16:creationId xmlns:a16="http://schemas.microsoft.com/office/drawing/2014/main" id="{B4077C72-0C7D-4634-8D5E-DA3BBF590F6D}"/>
+                    </a:ext>
+                  </a:extLst>
+                </p:cNvPr>
+                <p:cNvSpPr txBox="1">
+                  <a:spLocks noRot="1" noChangeAspect="1" noMove="1" noResize="1" noEditPoints="1" noAdjustHandles="1" noChangeArrowheads="1" noChangeShapeType="1" noTextEdit="1"/>
+                </p:cNvSpPr>
+                <p:nvPr/>
+              </p:nvSpPr>
+              <p:spPr>
+                <a:xfrm>
+                  <a:off x="7784256" y="2710103"/>
+                  <a:ext cx="549317" cy="253916"/>
+                </a:xfrm>
+                <a:prstGeom prst="rect">
+                  <a:avLst/>
+                </a:prstGeom>
+                <a:blipFill>
+                  <a:blip r:embed="rId6"/>
+                  <a:stretch>
+                    <a:fillRect b="-7317"/>
+                  </a:stretch>
+                </a:blipFill>
+              </p:spPr>
+              <p:txBody>
+                <a:bodyPr/>
+                <a:lstStyle/>
+                <a:p>
+                  <a:r>
+                    <a:rPr lang="en-US">
+                      <a:noFill/>
+                    </a:rPr>
+                    <a:t> </a:t>
+                  </a:r>
+                </a:p>
+              </p:txBody>
+            </p:sp>
+          </mc:Fallback>
+        </mc:AlternateContent>
+        <p:cxnSp>
+          <p:nvCxnSpPr>
+            <p:cNvPr id="188" name="Straight Arrow Connector 187">
               <a:extLst>
                 <a:ext uri="{FF2B5EF4-FFF2-40B4-BE49-F238E27FC236}">
-                  <a16:creationId xmlns:a16="http://schemas.microsoft.com/office/drawing/2014/main" id="{8E431827-8B6E-4C87-9762-511533252170}"/>
+                  <a16:creationId xmlns:a16="http://schemas.microsoft.com/office/drawing/2014/main" id="{67ADAC82-D4D2-4757-9BC6-DF8E72C411CB}"/>
                 </a:ext>
               </a:extLst>
             </p:cNvPr>
-            <p:cNvSpPr/>
+            <p:cNvCxnSpPr>
+              <a:cxnSpLocks/>
+              <a:stCxn id="338" idx="5"/>
+              <a:endCxn id="187" idx="1"/>
+            </p:cNvCxnSpPr>
             <p:nvPr/>
-          </p:nvSpPr>
+          </p:nvCxnSpPr>
           <p:spPr>
-            <a:xfrm>
-              <a:off x="2494517" y="4049300"/>
-              <a:ext cx="789366" cy="144285"/>
+            <a:xfrm flipV="1">
+              <a:off x="7542446" y="2837061"/>
+              <a:ext cx="241810" cy="4280"/>
             </a:xfrm>
-            <a:prstGeom prst="cube">
+            <a:prstGeom prst="straightConnector1">
               <a:avLst/>
             </a:prstGeom>
-            <a:solidFill>
-              <a:srgbClr val="00B0F0"/>
-            </a:solidFill>
-            <a:ln/>
+            <a:ln w="6350">
+              <a:solidFill>
+                <a:schemeClr val="tx1"/>
+              </a:solidFill>
+              <a:tailEnd type="triangle" w="sm" len="sm"/>
+            </a:ln>
           </p:spPr>
           <p:style>
-            <a:lnRef idx="2">
-              <a:schemeClr val="dk1"/>
+            <a:lnRef idx="1">
+              <a:schemeClr val="accent1"/>
             </a:lnRef>
-            <a:fillRef idx="1">
-              <a:schemeClr val="lt1"/>
+            <a:fillRef idx="0">
+              <a:schemeClr val="accent1"/>
             </a:fillRef>
             <a:effectRef idx="0">
-              <a:schemeClr val="dk1"/>
+              <a:schemeClr val="accent1"/>
             </a:effectRef>
             <a:fontRef idx="minor">
-              <a:schemeClr val="dk1"/>
+              <a:schemeClr val="tx1"/>
             </a:fontRef>
           </p:style>
-          <p:txBody>
-            <a:bodyPr rtlCol="0" anchor="ctr"/>
-            <a:lstStyle/>
-            <a:p>
-              <a:pPr algn="ctr"/>
-              <a:endParaRPr lang="en-US"/>
-            </a:p>
-          </p:txBody>
-        </p:sp>
-        <p:sp>
-          <p:nvSpPr>
-            <p:cNvPr id="164" name="Rectangle 163">
+        </p:cxnSp>
+        <p:cxnSp>
+          <p:nvCxnSpPr>
+            <p:cNvPr id="191" name="Straight Arrow Connector 190">
               <a:extLst>
                 <a:ext uri="{FF2B5EF4-FFF2-40B4-BE49-F238E27FC236}">
-                  <a16:creationId xmlns:a16="http://schemas.microsoft.com/office/drawing/2014/main" id="{9BE0F158-E686-462B-AC91-8B6AC5D0C1E1}"/>
+                  <a16:creationId xmlns:a16="http://schemas.microsoft.com/office/drawing/2014/main" id="{955F8258-41A3-4A05-B370-2D655C31FE1D}"/>
                 </a:ext>
               </a:extLst>
             </p:cNvPr>
-            <p:cNvSpPr/>
+            <p:cNvCxnSpPr>
+              <a:cxnSpLocks/>
+              <a:stCxn id="174" idx="5"/>
+              <a:endCxn id="172" idx="1"/>
+            </p:cNvCxnSpPr>
             <p:nvPr/>
-          </p:nvSpPr>
+          </p:nvCxnSpPr>
           <p:spPr>
-            <a:xfrm>
-              <a:off x="2406800" y="4233779"/>
-              <a:ext cx="983014" cy="253916"/>
+            <a:xfrm flipV="1">
+              <a:off x="7538902" y="3436689"/>
+              <a:ext cx="245354" cy="6591"/>
             </a:xfrm>
-            <a:prstGeom prst="rect">
+            <a:prstGeom prst="straightConnector1">
               <a:avLst/>
             </a:prstGeom>
-          </p:spPr>
-          <p:txBody>
-            <a:bodyPr wrap="square">
-              <a:spAutoFit/>
-            </a:bodyPr>
-            <a:lstStyle/>
-            <a:p>
-              <a:pPr lvl="0" algn="ctr"/>
-              <a:r>
-                <a:rPr lang="en-US" sz="1050" i="1" dirty="0" err="1">
-                  <a:solidFill>
-                    <a:prstClr val="black"/>
-                  </a:solidFill>
-                  <a:latin typeface="Arial" panose="020B0604020202020204" pitchFamily="34" charset="0"/>
-                  <a:cs typeface="Arial" panose="020B0604020202020204" pitchFamily="34" charset="0"/>
-                </a:rPr>
-                <a:t>ObsEncFC</a:t>
-              </a:r>
-              <a:endParaRPr lang="en-US" sz="1050" i="1" dirty="0">
-                <a:solidFill>
-                  <a:prstClr val="black"/>
-                </a:solidFill>
-                <a:latin typeface="Arial" panose="020B0604020202020204" pitchFamily="34" charset="0"/>
-                <a:cs typeface="Arial" panose="020B0604020202020204" pitchFamily="34" charset="0"/>
-              </a:endParaRPr>
-            </a:p>
-          </p:txBody>
-        </p:sp>
-      </p:grpSp>
-      <p:cxnSp>
-        <p:nvCxnSpPr>
-          <p:cNvPr id="169" name="Straight Arrow Connector 168">
-            <a:extLst>
-              <a:ext uri="{FF2B5EF4-FFF2-40B4-BE49-F238E27FC236}">
-                <a16:creationId xmlns:a16="http://schemas.microsoft.com/office/drawing/2014/main" id="{3FD37AD2-5055-4750-AB55-9B7384F256B0}"/>
-              </a:ext>
-            </a:extLst>
-          </p:cNvPr>
-          <p:cNvCxnSpPr>
-            <a:cxnSpLocks/>
-            <a:stCxn id="398" idx="1"/>
-            <a:endCxn id="163" idx="5"/>
-          </p:cNvCxnSpPr>
-          <p:nvPr/>
-        </p:nvCxnSpPr>
-        <p:spPr>
-          <a:xfrm flipH="1">
-            <a:off x="7542446" y="1914539"/>
-            <a:ext cx="273271" cy="5368"/>
-          </a:xfrm>
-          <a:prstGeom prst="straightConnector1">
-            <a:avLst/>
-          </a:prstGeom>
-          <a:ln w="6350">
-            <a:solidFill>
-              <a:schemeClr val="tx1"/>
-            </a:solidFill>
-            <a:tailEnd type="triangle" w="sm" len="sm"/>
-          </a:ln>
-        </p:spPr>
-        <p:style>
-          <a:lnRef idx="1">
-            <a:schemeClr val="accent1"/>
-          </a:lnRef>
-          <a:fillRef idx="0">
-            <a:schemeClr val="accent1"/>
-          </a:fillRef>
-          <a:effectRef idx="0">
-            <a:schemeClr val="accent1"/>
-          </a:effectRef>
-          <a:fontRef idx="minor">
-            <a:schemeClr val="tx1"/>
-          </a:fontRef>
-        </p:style>
-      </p:cxnSp>
-      <p:grpSp>
-        <p:nvGrpSpPr>
-          <p:cNvPr id="173" name="Group 172">
-            <a:extLst>
-              <a:ext uri="{FF2B5EF4-FFF2-40B4-BE49-F238E27FC236}">
-                <a16:creationId xmlns:a16="http://schemas.microsoft.com/office/drawing/2014/main" id="{2AA61D2A-C466-4EF0-9EEC-907687B35DCE}"/>
-              </a:ext>
-            </a:extLst>
-          </p:cNvPr>
-          <p:cNvGrpSpPr/>
-          <p:nvPr/>
-        </p:nvGrpSpPr>
-        <p:grpSpPr>
-          <a:xfrm>
-            <a:off x="6661819" y="3389173"/>
-            <a:ext cx="983014" cy="438395"/>
-            <a:chOff x="2406800" y="4049300"/>
-            <a:chExt cx="983014" cy="438395"/>
-          </a:xfrm>
-        </p:grpSpPr>
-        <p:sp>
-          <p:nvSpPr>
-            <p:cNvPr id="174" name="Cube 173">
-              <a:extLst>
-                <a:ext uri="{FF2B5EF4-FFF2-40B4-BE49-F238E27FC236}">
-                  <a16:creationId xmlns:a16="http://schemas.microsoft.com/office/drawing/2014/main" id="{84FA9FB2-FE8D-4B39-9CEF-F6CA7DF7F8D6}"/>
-                </a:ext>
-              </a:extLst>
-            </p:cNvPr>
-            <p:cNvSpPr/>
-            <p:nvPr/>
-          </p:nvSpPr>
-          <p:spPr>
-            <a:xfrm>
-              <a:off x="2494517" y="4049300"/>
-              <a:ext cx="789366" cy="144285"/>
-            </a:xfrm>
-            <a:prstGeom prst="cube">
-              <a:avLst/>
-            </a:prstGeom>
-            <a:solidFill>
-              <a:srgbClr val="7030A0"/>
-            </a:solidFill>
-            <a:ln/>
+            <a:ln w="6350">
+              <a:solidFill>
+                <a:schemeClr val="tx1"/>
+              </a:solidFill>
+              <a:tailEnd type="triangle" w="sm" len="sm"/>
+            </a:ln>
           </p:spPr>
           <p:style>
-            <a:lnRef idx="2">
-              <a:schemeClr val="dk1"/>
+            <a:lnRef idx="1">
+              <a:schemeClr val="accent1"/>
             </a:lnRef>
-            <a:fillRef idx="1">
-              <a:schemeClr val="lt1"/>
+            <a:fillRef idx="0">
+              <a:schemeClr val="accent1"/>
             </a:fillRef>
             <a:effectRef idx="0">
-              <a:schemeClr val="dk1"/>
+              <a:schemeClr val="accent1"/>
             </a:effectRef>
             <a:fontRef idx="minor">
-              <a:schemeClr val="dk1"/>
+              <a:schemeClr val="tx1"/>
             </a:fontRef>
           </p:style>
-          <p:txBody>
-            <a:bodyPr rtlCol="0" anchor="ctr"/>
-            <a:lstStyle/>
-            <a:p>
-              <a:pPr algn="ctr"/>
-              <a:endParaRPr lang="en-US"/>
-            </a:p>
-          </p:txBody>
-        </p:sp>
-        <p:sp>
-          <p:nvSpPr>
-            <p:cNvPr id="175" name="Rectangle 174">
-              <a:extLst>
-                <a:ext uri="{FF2B5EF4-FFF2-40B4-BE49-F238E27FC236}">
-                  <a16:creationId xmlns:a16="http://schemas.microsoft.com/office/drawing/2014/main" id="{909EB882-A041-48E9-9057-3EE815BD674D}"/>
-                </a:ext>
-              </a:extLst>
-            </p:cNvPr>
-            <p:cNvSpPr/>
-            <p:nvPr/>
-          </p:nvSpPr>
-          <p:spPr>
-            <a:xfrm>
-              <a:off x="2406800" y="4233779"/>
-              <a:ext cx="983014" cy="253916"/>
-            </a:xfrm>
-            <a:prstGeom prst="rect">
-              <a:avLst/>
-            </a:prstGeom>
-          </p:spPr>
-          <p:txBody>
-            <a:bodyPr wrap="square">
-              <a:spAutoFit/>
-            </a:bodyPr>
-            <a:lstStyle/>
-            <a:p>
-              <a:pPr lvl="0" algn="ctr"/>
-              <a:r>
-                <a:rPr lang="en-US" sz="1050" i="1" dirty="0" err="1">
-                  <a:solidFill>
-                    <a:prstClr val="black"/>
-                  </a:solidFill>
-                  <a:latin typeface="Arial" panose="020B0604020202020204" pitchFamily="34" charset="0"/>
-                  <a:cs typeface="Arial" panose="020B0604020202020204" pitchFamily="34" charset="0"/>
-                </a:rPr>
-                <a:t>ODecFC</a:t>
-              </a:r>
-              <a:endParaRPr lang="en-US" sz="1050" i="1" dirty="0">
-                <a:solidFill>
-                  <a:prstClr val="black"/>
-                </a:solidFill>
-                <a:latin typeface="Arial" panose="020B0604020202020204" pitchFamily="34" charset="0"/>
-                <a:cs typeface="Arial" panose="020B0604020202020204" pitchFamily="34" charset="0"/>
-              </a:endParaRPr>
-            </a:p>
-          </p:txBody>
-        </p:sp>
+        </p:cxnSp>
       </p:grpSp>
-      <p:cxnSp>
-        <p:nvCxnSpPr>
-          <p:cNvPr id="12" name="Straight Arrow Connector 11">
-            <a:extLst>
-              <a:ext uri="{FF2B5EF4-FFF2-40B4-BE49-F238E27FC236}">
-                <a16:creationId xmlns:a16="http://schemas.microsoft.com/office/drawing/2014/main" id="{0C44B696-58D5-4935-91C7-65C20B28E004}"/>
-              </a:ext>
-            </a:extLst>
-          </p:cNvPr>
-          <p:cNvCxnSpPr/>
-          <p:nvPr/>
-        </p:nvCxnSpPr>
-        <p:spPr>
-          <a:xfrm>
-            <a:off x="4785567" y="2340007"/>
-            <a:ext cx="0" cy="667518"/>
-          </a:xfrm>
-          <a:prstGeom prst="straightConnector1">
-            <a:avLst/>
-          </a:prstGeom>
-          <a:ln>
-            <a:solidFill>
-              <a:schemeClr val="tx1"/>
-            </a:solidFill>
-            <a:headEnd type="triangle" w="sm" len="sm"/>
-            <a:tailEnd type="triangle" w="sm" len="sm"/>
-          </a:ln>
-        </p:spPr>
-        <p:style>
-          <a:lnRef idx="1">
-            <a:schemeClr val="accent1"/>
-          </a:lnRef>
-          <a:fillRef idx="0">
-            <a:schemeClr val="accent1"/>
-          </a:fillRef>
-          <a:effectRef idx="0">
-            <a:schemeClr val="accent1"/>
-          </a:effectRef>
-          <a:fontRef idx="minor">
-            <a:schemeClr val="tx1"/>
-          </a:fontRef>
-        </p:style>
-      </p:cxnSp>
-      <p:cxnSp>
-        <p:nvCxnSpPr>
-          <p:cNvPr id="180" name="Straight Arrow Connector 179">
-            <a:extLst>
-              <a:ext uri="{FF2B5EF4-FFF2-40B4-BE49-F238E27FC236}">
-                <a16:creationId xmlns:a16="http://schemas.microsoft.com/office/drawing/2014/main" id="{0CF48F93-D177-48D4-9A9A-1F636860A8FE}"/>
-              </a:ext>
-            </a:extLst>
-          </p:cNvPr>
-          <p:cNvCxnSpPr>
-            <a:cxnSpLocks/>
-          </p:cNvCxnSpPr>
-          <p:nvPr/>
-        </p:nvCxnSpPr>
-        <p:spPr>
-          <a:xfrm>
-            <a:off x="5403273" y="2669129"/>
-            <a:ext cx="509508" cy="0"/>
-          </a:xfrm>
-          <a:prstGeom prst="straightConnector1">
-            <a:avLst/>
-          </a:prstGeom>
-          <a:ln w="6350">
-            <a:solidFill>
-              <a:schemeClr val="tx1"/>
-            </a:solidFill>
-            <a:tailEnd type="triangle" w="sm" len="sm"/>
-          </a:ln>
-        </p:spPr>
-        <p:style>
-          <a:lnRef idx="1">
-            <a:schemeClr val="accent1"/>
-          </a:lnRef>
-          <a:fillRef idx="0">
-            <a:schemeClr val="accent1"/>
-          </a:fillRef>
-          <a:effectRef idx="0">
-            <a:schemeClr val="accent1"/>
-          </a:effectRef>
-          <a:fontRef idx="minor">
-            <a:schemeClr val="tx1"/>
-          </a:fontRef>
-        </p:style>
-      </p:cxnSp>
-      <p:cxnSp>
-        <p:nvCxnSpPr>
-          <p:cNvPr id="27" name="Connector: Elbow 26">
-            <a:extLst>
-              <a:ext uri="{FF2B5EF4-FFF2-40B4-BE49-F238E27FC236}">
-                <a16:creationId xmlns:a16="http://schemas.microsoft.com/office/drawing/2014/main" id="{107A5C54-222D-43E1-B9AB-6C3954E50CFC}"/>
-              </a:ext>
-            </a:extLst>
-          </p:cNvPr>
-          <p:cNvCxnSpPr>
-            <a:stCxn id="308" idx="5"/>
-            <a:endCxn id="338" idx="2"/>
-          </p:cNvCxnSpPr>
-          <p:nvPr/>
-        </p:nvCxnSpPr>
-        <p:spPr>
-          <a:xfrm flipV="1">
-            <a:off x="6407358" y="2877412"/>
-            <a:ext cx="345722" cy="339127"/>
-          </a:xfrm>
-          <a:prstGeom prst="bentConnector3">
-            <a:avLst/>
-          </a:prstGeom>
-          <a:ln>
-            <a:solidFill>
-              <a:schemeClr val="tx1"/>
-            </a:solidFill>
-            <a:tailEnd type="triangle" w="sm" len="sm"/>
-          </a:ln>
-        </p:spPr>
-        <p:style>
-          <a:lnRef idx="1">
-            <a:schemeClr val="accent1"/>
-          </a:lnRef>
-          <a:fillRef idx="0">
-            <a:schemeClr val="accent1"/>
-          </a:fillRef>
-          <a:effectRef idx="0">
-            <a:schemeClr val="accent1"/>
-          </a:effectRef>
-          <a:fontRef idx="minor">
-            <a:schemeClr val="tx1"/>
-          </a:fontRef>
-        </p:style>
-      </p:cxnSp>
-      <p:cxnSp>
-        <p:nvCxnSpPr>
-          <p:cNvPr id="29" name="Connector: Elbow 28">
-            <a:extLst>
-              <a:ext uri="{FF2B5EF4-FFF2-40B4-BE49-F238E27FC236}">
-                <a16:creationId xmlns:a16="http://schemas.microsoft.com/office/drawing/2014/main" id="{40CA8ED3-4BF5-4BBB-9BC8-DCF9D5BB448B}"/>
-              </a:ext>
-            </a:extLst>
-          </p:cNvPr>
-          <p:cNvCxnSpPr>
-            <a:stCxn id="308" idx="5"/>
-            <a:endCxn id="174" idx="2"/>
-          </p:cNvCxnSpPr>
-          <p:nvPr/>
-        </p:nvCxnSpPr>
-        <p:spPr>
-          <a:xfrm>
-            <a:off x="6407358" y="3216539"/>
-            <a:ext cx="342178" cy="262812"/>
-          </a:xfrm>
-          <a:prstGeom prst="bentConnector3">
-            <a:avLst/>
-          </a:prstGeom>
-          <a:ln>
-            <a:solidFill>
-              <a:schemeClr val="tx1"/>
-            </a:solidFill>
-            <a:tailEnd type="triangle" w="sm" len="sm"/>
-          </a:ln>
-        </p:spPr>
-        <p:style>
-          <a:lnRef idx="1">
-            <a:schemeClr val="accent1"/>
-          </a:lnRef>
-          <a:fillRef idx="0">
-            <a:schemeClr val="accent1"/>
-          </a:fillRef>
-          <a:effectRef idx="0">
-            <a:schemeClr val="accent1"/>
-          </a:effectRef>
-          <a:fontRef idx="minor">
-            <a:schemeClr val="tx1"/>
-          </a:fontRef>
-        </p:style>
-      </p:cxnSp>
-      <mc:AlternateContent xmlns:mc="http://schemas.openxmlformats.org/markup-compatibility/2006">
-        <mc:Choice xmlns:a14="http://schemas.microsoft.com/office/drawing/2010/main" Requires="a14">
-          <p:sp>
-            <p:nvSpPr>
-              <p:cNvPr id="187" name="TextBox 186">
-                <a:extLst>
-                  <a:ext uri="{FF2B5EF4-FFF2-40B4-BE49-F238E27FC236}">
-                    <a16:creationId xmlns:a16="http://schemas.microsoft.com/office/drawing/2014/main" id="{B4077C72-0C7D-4634-8D5E-DA3BBF590F6D}"/>
-                  </a:ext>
-                </a:extLst>
-              </p:cNvPr>
-              <p:cNvSpPr txBox="1"/>
-              <p:nvPr/>
-            </p:nvSpPr>
-            <p:spPr>
-              <a:xfrm>
-                <a:off x="7784256" y="2710103"/>
-                <a:ext cx="549317" cy="253916"/>
-              </a:xfrm>
-              <a:prstGeom prst="rect">
-                <a:avLst/>
-              </a:prstGeom>
-              <a:noFill/>
-            </p:spPr>
-            <p:txBody>
-              <a:bodyPr wrap="none" rtlCol="0">
-                <a:spAutoFit/>
-              </a:bodyPr>
-              <a:lstStyle/>
-              <a:p>
-                <a:pPr/>
-                <a14:m>
-                  <m:oMathPara xmlns:m="http://schemas.openxmlformats.org/officeDocument/2006/math">
-                    <m:oMathParaPr>
-                      <m:jc m:val="centerGroup"/>
-                    </m:oMathParaPr>
-                    <m:oMath xmlns:m="http://schemas.openxmlformats.org/officeDocument/2006/math">
-                      <m:sSub>
-                        <m:sSubPr>
-                          <m:ctrlPr>
-                            <a:rPr lang="en-US" sz="1050" b="1" i="1" smtClean="0">
-                              <a:latin typeface="Cambria Math" panose="02040503050406030204" pitchFamily="18" charset="0"/>
-                            </a:rPr>
-                          </m:ctrlPr>
-                        </m:sSubPr>
-                        <m:e>
-                          <m:acc>
-                            <m:accPr>
-                              <m:chr m:val="⃗"/>
-                              <m:ctrlPr>
-                                <a:rPr lang="en-US" sz="1050" b="1" i="1" smtClean="0">
-                                  <a:latin typeface="Cambria Math" panose="02040503050406030204" pitchFamily="18" charset="0"/>
-                                </a:rPr>
-                              </m:ctrlPr>
-                            </m:accPr>
-                            <m:e>
-                              <m:r>
-                                <a:rPr lang="en-US" sz="1050" b="1" i="1" smtClean="0">
-                                  <a:latin typeface="Cambria Math" panose="02040503050406030204" pitchFamily="18" charset="0"/>
-                                </a:rPr>
-                                <m:t>𝒑</m:t>
-                              </m:r>
-                            </m:e>
-                          </m:acc>
-                        </m:e>
-                        <m:sub>
-                          <m:r>
-                            <a:rPr lang="en-US" sz="1050" b="1" i="1" smtClean="0">
-                              <a:latin typeface="Cambria Math" panose="02040503050406030204" pitchFamily="18" charset="0"/>
-                            </a:rPr>
-                            <m:t>𝑯</m:t>
-                          </m:r>
-                        </m:sub>
-                      </m:sSub>
-                      <m:r>
-                        <a:rPr lang="en-US" sz="1050" b="1" i="1" smtClean="0">
-                          <a:latin typeface="Cambria Math" panose="02040503050406030204" pitchFamily="18" charset="0"/>
-                        </a:rPr>
-                        <m:t>(</m:t>
-                      </m:r>
-                      <m:r>
-                        <a:rPr lang="en-US" sz="1050" b="1" i="1" smtClean="0">
-                          <a:latin typeface="Cambria Math" panose="02040503050406030204" pitchFamily="18" charset="0"/>
-                        </a:rPr>
-                        <m:t>𝒕</m:t>
-                      </m:r>
-                      <m:r>
-                        <a:rPr lang="en-US" sz="1050" b="1" i="1" smtClean="0">
-                          <a:latin typeface="Cambria Math" panose="02040503050406030204" pitchFamily="18" charset="0"/>
-                        </a:rPr>
-                        <m:t>)</m:t>
-                      </m:r>
-                    </m:oMath>
-                  </m:oMathPara>
-                </a14:m>
-                <a:endParaRPr lang="en-US" sz="1050" b="1" dirty="0"/>
-              </a:p>
-            </p:txBody>
-          </p:sp>
-        </mc:Choice>
-        <mc:Fallback>
-          <p:sp>
-            <p:nvSpPr>
-              <p:cNvPr id="187" name="TextBox 186">
-                <a:extLst>
-                  <a:ext uri="{FF2B5EF4-FFF2-40B4-BE49-F238E27FC236}">
-                    <a16:creationId xmlns:a16="http://schemas.microsoft.com/office/drawing/2014/main" id="{B4077C72-0C7D-4634-8D5E-DA3BBF590F6D}"/>
-                  </a:ext>
-                </a:extLst>
-              </p:cNvPr>
-              <p:cNvSpPr txBox="1">
-                <a:spLocks noRot="1" noChangeAspect="1" noMove="1" noResize="1" noEditPoints="1" noAdjustHandles="1" noChangeArrowheads="1" noChangeShapeType="1" noTextEdit="1"/>
-              </p:cNvSpPr>
-              <p:nvPr/>
-            </p:nvSpPr>
-            <p:spPr>
-              <a:xfrm>
-                <a:off x="7784256" y="2710103"/>
-                <a:ext cx="549317" cy="253916"/>
-              </a:xfrm>
-              <a:prstGeom prst="rect">
-                <a:avLst/>
-              </a:prstGeom>
-              <a:blipFill>
-                <a:blip r:embed="rId6"/>
-                <a:stretch>
-                  <a:fillRect b="-7317"/>
-                </a:stretch>
-              </a:blipFill>
-            </p:spPr>
-            <p:txBody>
-              <a:bodyPr/>
-              <a:lstStyle/>
-              <a:p>
-                <a:r>
-                  <a:rPr lang="en-US">
-                    <a:noFill/>
-                  </a:rPr>
-                  <a:t> </a:t>
-                </a:r>
-              </a:p>
-            </p:txBody>
-          </p:sp>
-        </mc:Fallback>
-      </mc:AlternateContent>
-      <p:cxnSp>
-        <p:nvCxnSpPr>
-          <p:cNvPr id="188" name="Straight Arrow Connector 187">
-            <a:extLst>
-              <a:ext uri="{FF2B5EF4-FFF2-40B4-BE49-F238E27FC236}">
-                <a16:creationId xmlns:a16="http://schemas.microsoft.com/office/drawing/2014/main" id="{67ADAC82-D4D2-4757-9BC6-DF8E72C411CB}"/>
-              </a:ext>
-            </a:extLst>
-          </p:cNvPr>
-          <p:cNvCxnSpPr>
-            <a:cxnSpLocks/>
-            <a:stCxn id="338" idx="5"/>
-            <a:endCxn id="187" idx="1"/>
-          </p:cNvCxnSpPr>
-          <p:nvPr/>
-        </p:nvCxnSpPr>
-        <p:spPr>
-          <a:xfrm flipV="1">
-            <a:off x="7542446" y="2837061"/>
-            <a:ext cx="241810" cy="4280"/>
-          </a:xfrm>
-          <a:prstGeom prst="straightConnector1">
-            <a:avLst/>
-          </a:prstGeom>
-          <a:ln w="6350">
-            <a:solidFill>
-              <a:schemeClr val="tx1"/>
-            </a:solidFill>
-            <a:tailEnd type="triangle" w="sm" len="sm"/>
-          </a:ln>
-        </p:spPr>
-        <p:style>
-          <a:lnRef idx="1">
-            <a:schemeClr val="accent1"/>
-          </a:lnRef>
-          <a:fillRef idx="0">
-            <a:schemeClr val="accent1"/>
-          </a:fillRef>
-          <a:effectRef idx="0">
-            <a:schemeClr val="accent1"/>
-          </a:effectRef>
-          <a:fontRef idx="minor">
-            <a:schemeClr val="tx1"/>
-          </a:fontRef>
-        </p:style>
-      </p:cxnSp>
-      <p:cxnSp>
-        <p:nvCxnSpPr>
-          <p:cNvPr id="191" name="Straight Arrow Connector 190">
-            <a:extLst>
-              <a:ext uri="{FF2B5EF4-FFF2-40B4-BE49-F238E27FC236}">
-                <a16:creationId xmlns:a16="http://schemas.microsoft.com/office/drawing/2014/main" id="{955F8258-41A3-4A05-B370-2D655C31FE1D}"/>
-              </a:ext>
-            </a:extLst>
-          </p:cNvPr>
-          <p:cNvCxnSpPr>
-            <a:cxnSpLocks/>
-            <a:stCxn id="174" idx="5"/>
-            <a:endCxn id="172" idx="1"/>
-          </p:cNvCxnSpPr>
-          <p:nvPr/>
-        </p:nvCxnSpPr>
-        <p:spPr>
-          <a:xfrm flipV="1">
-            <a:off x="7538902" y="3436689"/>
-            <a:ext cx="245354" cy="6591"/>
-          </a:xfrm>
-          <a:prstGeom prst="straightConnector1">
-            <a:avLst/>
-          </a:prstGeom>
-          <a:ln w="6350">
-            <a:solidFill>
-              <a:schemeClr val="tx1"/>
-            </a:solidFill>
-            <a:tailEnd type="triangle" w="sm" len="sm"/>
-          </a:ln>
-        </p:spPr>
-        <p:style>
-          <a:lnRef idx="1">
-            <a:schemeClr val="accent1"/>
-          </a:lnRef>
-          <a:fillRef idx="0">
-            <a:schemeClr val="accent1"/>
-          </a:fillRef>
-          <a:effectRef idx="0">
-            <a:schemeClr val="accent1"/>
-          </a:effectRef>
-          <a:fontRef idx="minor">
-            <a:schemeClr val="tx1"/>
-          </a:fontRef>
-        </p:style>
-      </p:cxnSp>
     </p:spTree>
     <p:extLst>
       <p:ext uri="{BB962C8B-B14F-4D97-AF65-F5344CB8AC3E}">

</xml_diff>